<commit_message>
finished the redesigning of the colors and also finished its section in the PowerPoint slides
</commit_message>
<xml_diff>
--- a/Creating Account/Redesign Powerpoint.pptx
+++ b/Creating Account/Redesign Powerpoint.pptx
@@ -2,13 +2,13 @@
 <file path=ppt/presentation.xml><?xml version="1.0" encoding="utf-8"?>
 <p:presentation xmlns:a="http://schemas.openxmlformats.org/drawingml/2006/main" xmlns:r="http://schemas.openxmlformats.org/officeDocument/2006/relationships" xmlns:p="http://schemas.openxmlformats.org/presentationml/2006/main" saveSubsetFonts="1">
   <p:sldMasterIdLst>
-    <p:sldMasterId id="2147483660" r:id="rId1"/>
+    <p:sldMasterId id="2147483719" r:id="rId1"/>
   </p:sldMasterIdLst>
   <p:sldIdLst>
     <p:sldId id="256" r:id="rId2"/>
     <p:sldId id="258" r:id="rId3"/>
-    <p:sldId id="260" r:id="rId4"/>
-    <p:sldId id="259" r:id="rId5"/>
+    <p:sldId id="259" r:id="rId4"/>
+    <p:sldId id="260" r:id="rId5"/>
   </p:sldIdLst>
   <p:sldSz cx="12192000" cy="6858000"/>
   <p:notesSz cx="6858000" cy="9144000"/>
@@ -107,6 +107,11 @@
       </a:defRPr>
     </a:lvl9pPr>
   </p:defaultTextStyle>
+  <p:extLst>
+    <p:ext uri="{EFAFB233-063F-42B5-8137-9DF3F51BA10A}">
+      <p15:sldGuideLst xmlns:p15="http://schemas.microsoft.com/office/powerpoint/2012/main"/>
+    </p:ext>
+  </p:extLst>
 </p:presentation>
 </file>
 
@@ -135,14 +140,14 @@
         </p:nvSpPr>
         <p:spPr>
           <a:xfrm>
-            <a:off x="0" y="761999"/>
-            <a:ext cx="9141619" cy="5334001"/>
+            <a:off x="1" y="6400800"/>
+            <a:ext cx="12192000" cy="457200"/>
           </a:xfrm>
           <a:prstGeom prst="rect">
             <a:avLst/>
           </a:prstGeom>
           <a:solidFill>
-            <a:schemeClr val="accent1"/>
+            <a:schemeClr val="accent2"/>
           </a:solidFill>
           <a:ln>
             <a:noFill/>
@@ -173,16 +178,14 @@
         </p:nvSpPr>
         <p:spPr>
           <a:xfrm>
-            <a:off x="9270263" y="761999"/>
-            <a:ext cx="2925318" cy="5334001"/>
+            <a:off x="1" y="6334316"/>
+            <a:ext cx="12192000" cy="66484"/>
           </a:xfrm>
           <a:prstGeom prst="rect">
             <a:avLst/>
           </a:prstGeom>
           <a:solidFill>
-            <a:srgbClr val="C8C8C8">
-              <a:alpha val="49804"/>
-            </a:srgbClr>
+            <a:schemeClr val="accent1"/>
           </a:solidFill>
           <a:ln>
             <a:noFill/>
@@ -217,8 +220,8 @@
         </p:nvSpPr>
         <p:spPr>
           <a:xfrm>
-            <a:off x="1069848" y="1298448"/>
-            <a:ext cx="7315200" cy="3255264"/>
+            <a:off x="1097280" y="758952"/>
+            <a:ext cx="10058400" cy="3566160"/>
           </a:xfrm>
         </p:spPr>
         <p:txBody>
@@ -227,9 +230,15 @@
           </a:bodyPr>
           <a:lstStyle>
             <a:lvl1pPr algn="l">
-              <a:defRPr sz="5900" spc="-100" baseline="0">
+              <a:lnSpc>
+                <a:spcPct val="85000"/>
+              </a:lnSpc>
+              <a:defRPr sz="8000" spc="-50" baseline="0">
                 <a:solidFill>
-                  <a:srgbClr val="FFFFFF"/>
+                  <a:schemeClr val="tx1">
+                    <a:lumMod val="85000"/>
+                    <a:lumOff val="15000"/>
+                  </a:schemeClr>
                 </a:solidFill>
               </a:defRPr>
             </a:lvl1pPr>
@@ -255,33 +264,31 @@
         </p:nvSpPr>
         <p:spPr>
           <a:xfrm>
-            <a:off x="1100015" y="4670246"/>
-            <a:ext cx="7315200" cy="914400"/>
-          </a:xfrm>
-        </p:spPr>
-        <p:txBody>
-          <a:bodyPr anchor="t">
+            <a:off x="1100051" y="4455621"/>
+            <a:ext cx="10058400" cy="1143000"/>
+          </a:xfrm>
+        </p:spPr>
+        <p:txBody>
+          <a:bodyPr lIns="91440" rIns="91440">
             <a:normAutofit/>
           </a:bodyPr>
           <a:lstStyle>
             <a:lvl1pPr marL="0" indent="0" algn="l">
               <a:buNone/>
-              <a:defRPr sz="2200" cap="none" spc="0" baseline="0">
+              <a:defRPr sz="2400" cap="all" spc="200" baseline="0">
                 <a:solidFill>
-                  <a:schemeClr val="accent1">
-                    <a:lumMod val="20000"/>
-                    <a:lumOff val="80000"/>
-                  </a:schemeClr>
+                  <a:schemeClr val="tx2"/>
                 </a:solidFill>
+                <a:latin typeface="+mj-lt"/>
               </a:defRPr>
             </a:lvl1pPr>
             <a:lvl2pPr marL="457200" indent="0" algn="ctr">
               <a:buNone/>
-              <a:defRPr sz="2200"/>
+              <a:defRPr sz="2400"/>
             </a:lvl2pPr>
             <a:lvl3pPr marL="914400" indent="0" algn="ctr">
               <a:buNone/>
-              <a:defRPr sz="2200"/>
+              <a:defRPr sz="2400"/>
             </a:lvl3pPr>
             <a:lvl4pPr marL="1371600" indent="0" algn="ctr">
               <a:buNone/>
@@ -334,7 +341,7 @@
           <a:p>
             <a:fld id="{4A1D9E61-7A34-4455-A944-7760DD9E2D94}" type="datetimeFigureOut">
               <a:rPr lang="en-US" smtClean="0"/>
-              <a:t>4/7/2022</a:t>
+              <a:t>4/12/2022</a:t>
             </a:fld>
             <a:endParaRPr lang="en-US"/>
           </a:p>
@@ -382,10 +389,48 @@
           </a:p>
         </p:txBody>
       </p:sp>
+      <p:cxnSp>
+        <p:nvCxnSpPr>
+          <p:cNvPr id="9" name="Straight Connector 8"/>
+          <p:cNvCxnSpPr/>
+          <p:nvPr/>
+        </p:nvCxnSpPr>
+        <p:spPr>
+          <a:xfrm>
+            <a:off x="1207658" y="4343400"/>
+            <a:ext cx="9875520" cy="0"/>
+          </a:xfrm>
+          <a:prstGeom prst="line">
+            <a:avLst/>
+          </a:prstGeom>
+          <a:ln w="6350">
+            <a:solidFill>
+              <a:schemeClr val="tx1">
+                <a:lumMod val="50000"/>
+                <a:lumOff val="50000"/>
+              </a:schemeClr>
+            </a:solidFill>
+          </a:ln>
+        </p:spPr>
+        <p:style>
+          <a:lnRef idx="1">
+            <a:schemeClr val="accent1"/>
+          </a:lnRef>
+          <a:fillRef idx="0">
+            <a:schemeClr val="accent1"/>
+          </a:fillRef>
+          <a:effectRef idx="0">
+            <a:schemeClr val="accent1"/>
+          </a:effectRef>
+          <a:fontRef idx="minor">
+            <a:schemeClr val="tx1"/>
+          </a:fontRef>
+        </p:style>
+      </p:cxnSp>
     </p:spTree>
     <p:extLst>
       <p:ext uri="{BB962C8B-B14F-4D97-AF65-F5344CB8AC3E}">
-        <p14:creationId xmlns:p14="http://schemas.microsoft.com/office/powerpoint/2010/main" val="387127321"/>
+        <p14:creationId xmlns:p14="http://schemas.microsoft.com/office/powerpoint/2010/main" val="3529972081"/>
       </p:ext>
     </p:extLst>
   </p:cSld>
@@ -447,7 +492,7 @@
         </p:nvSpPr>
         <p:spPr/>
         <p:txBody>
-          <a:bodyPr vert="eaVert" anchor="t"/>
+          <a:bodyPr vert="eaVert" lIns="45720" tIns="0" rIns="45720" bIns="0"/>
           <a:lstStyle/>
           <a:p>
             <a:pPr lvl="0"/>
@@ -489,7 +534,7 @@
       </p:sp>
       <p:sp>
         <p:nvSpPr>
-          <p:cNvPr id="7" name="Date Placeholder 6"/>
+          <p:cNvPr id="4" name="Date Placeholder 3"/>
           <p:cNvSpPr>
             <a:spLocks noGrp="1"/>
           </p:cNvSpPr>
@@ -504,7 +549,7 @@
           <a:p>
             <a:fld id="{4A1D9E61-7A34-4455-A944-7760DD9E2D94}" type="datetimeFigureOut">
               <a:rPr lang="en-US" smtClean="0"/>
-              <a:t>4/7/2022</a:t>
+              <a:t>4/12/2022</a:t>
             </a:fld>
             <a:endParaRPr lang="en-US"/>
           </a:p>
@@ -512,7 +557,7 @@
       </p:sp>
       <p:sp>
         <p:nvSpPr>
-          <p:cNvPr id="8" name="Footer Placeholder 7"/>
+          <p:cNvPr id="5" name="Footer Placeholder 4"/>
           <p:cNvSpPr>
             <a:spLocks noGrp="1"/>
           </p:cNvSpPr>
@@ -531,7 +576,7 @@
       </p:sp>
       <p:sp>
         <p:nvSpPr>
-          <p:cNvPr id="9" name="Slide Number Placeholder 8"/>
+          <p:cNvPr id="6" name="Slide Number Placeholder 5"/>
           <p:cNvSpPr>
             <a:spLocks noGrp="1"/>
           </p:cNvSpPr>
@@ -555,7 +600,7 @@
     </p:spTree>
     <p:extLst>
       <p:ext uri="{BB962C8B-B14F-4D97-AF65-F5344CB8AC3E}">
-        <p14:creationId xmlns:p14="http://schemas.microsoft.com/office/powerpoint/2010/main" val="3901456220"/>
+        <p14:creationId xmlns:p14="http://schemas.microsoft.com/office/powerpoint/2010/main" val="3936439488"/>
       </p:ext>
     </p:extLst>
   </p:cSld>
@@ -566,7 +611,7 @@
 </file>
 
 <file path=ppt/slideLayouts/slideLayout11.xml><?xml version="1.0" encoding="utf-8"?>
-<p:sldLayout xmlns:a="http://schemas.openxmlformats.org/drawingml/2006/main" xmlns:r="http://schemas.openxmlformats.org/officeDocument/2006/relationships" xmlns:p="http://schemas.openxmlformats.org/presentationml/2006/main" type="vertTitleAndTx" preserve="1">
+<p:sldLayout xmlns:a="http://schemas.openxmlformats.org/drawingml/2006/main" xmlns:r="http://schemas.openxmlformats.org/officeDocument/2006/relationships" xmlns:p="http://schemas.openxmlformats.org/presentationml/2006/main" showMasterSp="0" type="vertTitleAndTx" preserve="1">
   <p:cSld name="Vertical Title and Text">
     <p:spTree>
       <p:nvGrpSpPr>
@@ -584,6 +629,82 @@
       </p:grpSpPr>
       <p:sp>
         <p:nvSpPr>
+          <p:cNvPr id="7" name="Rectangle 6"/>
+          <p:cNvSpPr/>
+          <p:nvPr/>
+        </p:nvSpPr>
+        <p:spPr>
+          <a:xfrm>
+            <a:off x="3175" y="6400800"/>
+            <a:ext cx="12188825" cy="457200"/>
+          </a:xfrm>
+          <a:prstGeom prst="rect">
+            <a:avLst/>
+          </a:prstGeom>
+          <a:solidFill>
+            <a:schemeClr val="accent2"/>
+          </a:solidFill>
+          <a:ln>
+            <a:noFill/>
+          </a:ln>
+        </p:spPr>
+        <p:style>
+          <a:lnRef idx="2">
+            <a:schemeClr val="accent1">
+              <a:shade val="50000"/>
+            </a:schemeClr>
+          </a:lnRef>
+          <a:fillRef idx="1">
+            <a:schemeClr val="accent1"/>
+          </a:fillRef>
+          <a:effectRef idx="0">
+            <a:schemeClr val="accent1"/>
+          </a:effectRef>
+          <a:fontRef idx="minor">
+            <a:schemeClr val="lt1"/>
+          </a:fontRef>
+        </p:style>
+      </p:sp>
+      <p:sp>
+        <p:nvSpPr>
+          <p:cNvPr id="8" name="Rectangle 7"/>
+          <p:cNvSpPr/>
+          <p:nvPr/>
+        </p:nvSpPr>
+        <p:spPr>
+          <a:xfrm>
+            <a:off x="15" y="6334316"/>
+            <a:ext cx="12188825" cy="64008"/>
+          </a:xfrm>
+          <a:prstGeom prst="rect">
+            <a:avLst/>
+          </a:prstGeom>
+          <a:solidFill>
+            <a:schemeClr val="accent1"/>
+          </a:solidFill>
+          <a:ln>
+            <a:noFill/>
+          </a:ln>
+        </p:spPr>
+        <p:style>
+          <a:lnRef idx="2">
+            <a:schemeClr val="accent1">
+              <a:shade val="50000"/>
+            </a:schemeClr>
+          </a:lnRef>
+          <a:fillRef idx="1">
+            <a:schemeClr val="accent1"/>
+          </a:fillRef>
+          <a:effectRef idx="0">
+            <a:schemeClr val="accent1"/>
+          </a:effectRef>
+          <a:fontRef idx="minor">
+            <a:schemeClr val="lt1"/>
+          </a:fontRef>
+        </p:style>
+      </p:sp>
+      <p:sp>
+        <p:nvSpPr>
           <p:cNvPr id="2" name="Vertical Title 1"/>
           <p:cNvSpPr>
             <a:spLocks noGrp="1"/>
@@ -594,8 +715,8 @@
         </p:nvSpPr>
         <p:spPr>
           <a:xfrm>
-            <a:off x="381000" y="990600"/>
-            <a:ext cx="2819400" cy="4953000"/>
+            <a:off x="8724900" y="412302"/>
+            <a:ext cx="2628900" cy="5759898"/>
           </a:xfrm>
         </p:spPr>
         <p:txBody>
@@ -622,12 +743,12 @@
         </p:nvSpPr>
         <p:spPr>
           <a:xfrm>
-            <a:off x="3867912" y="868680"/>
-            <a:ext cx="7315200" cy="5120640"/>
-          </a:xfrm>
-        </p:spPr>
-        <p:txBody>
-          <a:bodyPr vert="eaVert" anchor="t"/>
+            <a:off x="838200" y="412302"/>
+            <a:ext cx="7734300" cy="5759898"/>
+          </a:xfrm>
+        </p:spPr>
+        <p:txBody>
+          <a:bodyPr vert="eaVert" lIns="45720" tIns="0" rIns="45720" bIns="0"/>
           <a:lstStyle/>
           <a:p>
             <a:pPr lvl="0"/>
@@ -669,7 +790,7 @@
       </p:sp>
       <p:sp>
         <p:nvSpPr>
-          <p:cNvPr id="7" name="Date Placeholder 6"/>
+          <p:cNvPr id="4" name="Date Placeholder 3"/>
           <p:cNvSpPr>
             <a:spLocks noGrp="1"/>
           </p:cNvSpPr>
@@ -684,7 +805,7 @@
           <a:p>
             <a:fld id="{4A1D9E61-7A34-4455-A944-7760DD9E2D94}" type="datetimeFigureOut">
               <a:rPr lang="en-US" smtClean="0"/>
-              <a:t>4/7/2022</a:t>
+              <a:t>4/12/2022</a:t>
             </a:fld>
             <a:endParaRPr lang="en-US"/>
           </a:p>
@@ -692,7 +813,7 @@
       </p:sp>
       <p:sp>
         <p:nvSpPr>
-          <p:cNvPr id="8" name="Footer Placeholder 7"/>
+          <p:cNvPr id="5" name="Footer Placeholder 4"/>
           <p:cNvSpPr>
             <a:spLocks noGrp="1"/>
           </p:cNvSpPr>
@@ -711,7 +832,7 @@
       </p:sp>
       <p:sp>
         <p:nvSpPr>
-          <p:cNvPr id="9" name="Slide Number Placeholder 8"/>
+          <p:cNvPr id="6" name="Slide Number Placeholder 5"/>
           <p:cNvSpPr>
             <a:spLocks noGrp="1"/>
           </p:cNvSpPr>
@@ -735,7 +856,7 @@
     </p:spTree>
     <p:extLst>
       <p:ext uri="{BB962C8B-B14F-4D97-AF65-F5344CB8AC3E}">
-        <p14:creationId xmlns:p14="http://schemas.microsoft.com/office/powerpoint/2010/main" val="2919106921"/>
+        <p14:creationId xmlns:p14="http://schemas.microsoft.com/office/powerpoint/2010/main" val="772997314"/>
       </p:ext>
     </p:extLst>
   </p:cSld>
@@ -854,7 +975,7 @@
           <a:p>
             <a:fld id="{4A1D9E61-7A34-4455-A944-7760DD9E2D94}" type="datetimeFigureOut">
               <a:rPr lang="en-US" smtClean="0"/>
-              <a:t>4/7/2022</a:t>
+              <a:t>4/12/2022</a:t>
             </a:fld>
             <a:endParaRPr lang="en-US"/>
           </a:p>
@@ -905,7 +1026,7 @@
     </p:spTree>
     <p:extLst>
       <p:ext uri="{BB962C8B-B14F-4D97-AF65-F5344CB8AC3E}">
-        <p14:creationId xmlns:p14="http://schemas.microsoft.com/office/powerpoint/2010/main" val="3841518939"/>
+        <p14:creationId xmlns:p14="http://schemas.microsoft.com/office/powerpoint/2010/main" val="1067752546"/>
       </p:ext>
     </p:extLst>
   </p:cSld>
@@ -916,8 +1037,16 @@
 </file>
 
 <file path=ppt/slideLayouts/slideLayout3.xml><?xml version="1.0" encoding="utf-8"?>
-<p:sldLayout xmlns:a="http://schemas.openxmlformats.org/drawingml/2006/main" xmlns:r="http://schemas.openxmlformats.org/officeDocument/2006/relationships" xmlns:p="http://schemas.openxmlformats.org/presentationml/2006/main" type="secHead" preserve="1">
+<p:sldLayout xmlns:a="http://schemas.openxmlformats.org/drawingml/2006/main" xmlns:r="http://schemas.openxmlformats.org/officeDocument/2006/relationships" xmlns:p="http://schemas.openxmlformats.org/presentationml/2006/main" showMasterSp="0" type="secHead" preserve="1">
   <p:cSld name="Section Header">
+    <p:bg>
+      <p:bgPr>
+        <a:solidFill>
+          <a:schemeClr val="bg1"/>
+        </a:solidFill>
+        <a:effectLst/>
+      </p:bgPr>
+    </p:bg>
     <p:spTree>
       <p:nvGrpSpPr>
         <p:cNvPr id="1" name=""/>
@@ -934,6 +1063,82 @@
       </p:grpSpPr>
       <p:sp>
         <p:nvSpPr>
+          <p:cNvPr id="7" name="Rectangle 6"/>
+          <p:cNvSpPr/>
+          <p:nvPr/>
+        </p:nvSpPr>
+        <p:spPr>
+          <a:xfrm>
+            <a:off x="3175" y="6400800"/>
+            <a:ext cx="12188825" cy="457200"/>
+          </a:xfrm>
+          <a:prstGeom prst="rect">
+            <a:avLst/>
+          </a:prstGeom>
+          <a:solidFill>
+            <a:schemeClr val="accent2"/>
+          </a:solidFill>
+          <a:ln>
+            <a:noFill/>
+          </a:ln>
+        </p:spPr>
+        <p:style>
+          <a:lnRef idx="2">
+            <a:schemeClr val="accent1">
+              <a:shade val="50000"/>
+            </a:schemeClr>
+          </a:lnRef>
+          <a:fillRef idx="1">
+            <a:schemeClr val="accent1"/>
+          </a:fillRef>
+          <a:effectRef idx="0">
+            <a:schemeClr val="accent1"/>
+          </a:effectRef>
+          <a:fontRef idx="minor">
+            <a:schemeClr val="lt1"/>
+          </a:fontRef>
+        </p:style>
+      </p:sp>
+      <p:sp>
+        <p:nvSpPr>
+          <p:cNvPr id="8" name="Rectangle 7"/>
+          <p:cNvSpPr/>
+          <p:nvPr/>
+        </p:nvSpPr>
+        <p:spPr>
+          <a:xfrm>
+            <a:off x="15" y="6334316"/>
+            <a:ext cx="12188825" cy="64008"/>
+          </a:xfrm>
+          <a:prstGeom prst="rect">
+            <a:avLst/>
+          </a:prstGeom>
+          <a:solidFill>
+            <a:schemeClr val="accent1"/>
+          </a:solidFill>
+          <a:ln>
+            <a:noFill/>
+          </a:ln>
+        </p:spPr>
+        <p:style>
+          <a:lnRef idx="2">
+            <a:schemeClr val="accent1">
+              <a:shade val="50000"/>
+            </a:schemeClr>
+          </a:lnRef>
+          <a:fillRef idx="1">
+            <a:schemeClr val="accent1"/>
+          </a:fillRef>
+          <a:effectRef idx="0">
+            <a:schemeClr val="accent1"/>
+          </a:effectRef>
+          <a:fontRef idx="minor">
+            <a:schemeClr val="lt1"/>
+          </a:fontRef>
+        </p:style>
+      </p:sp>
+      <p:sp>
+        <p:nvSpPr>
           <p:cNvPr id="2" name="Title 1"/>
           <p:cNvSpPr>
             <a:spLocks noGrp="1"/>
@@ -944,21 +1149,24 @@
         </p:nvSpPr>
         <p:spPr>
           <a:xfrm>
-            <a:off x="3867912" y="1298448"/>
-            <a:ext cx="7315200" cy="3255264"/>
-          </a:xfrm>
-        </p:spPr>
-        <p:txBody>
-          <a:bodyPr anchor="b">
+            <a:off x="1097280" y="758952"/>
+            <a:ext cx="10058400" cy="3566160"/>
+          </a:xfrm>
+        </p:spPr>
+        <p:txBody>
+          <a:bodyPr anchor="b" anchorCtr="0">
             <a:normAutofit/>
           </a:bodyPr>
           <a:lstStyle>
             <a:lvl1pPr>
-              <a:defRPr sz="5900" b="0" spc="-100" baseline="0">
+              <a:lnSpc>
+                <a:spcPct val="85000"/>
+              </a:lnSpc>
+              <a:defRPr sz="8000" b="0">
                 <a:solidFill>
                   <a:schemeClr val="tx1">
-                    <a:lumMod val="65000"/>
-                    <a:lumOff val="35000"/>
+                    <a:lumMod val="85000"/>
+                    <a:lumOff val="15000"/>
                   </a:schemeClr>
                 </a:solidFill>
               </a:defRPr>
@@ -985,24 +1193,22 @@
         </p:nvSpPr>
         <p:spPr>
           <a:xfrm>
-            <a:off x="3886200" y="4672584"/>
-            <a:ext cx="7315200" cy="914400"/>
-          </a:xfrm>
-        </p:spPr>
-        <p:txBody>
-          <a:bodyPr anchor="t">
+            <a:off x="1097280" y="4453128"/>
+            <a:ext cx="10058400" cy="1143000"/>
+          </a:xfrm>
+        </p:spPr>
+        <p:txBody>
+          <a:bodyPr lIns="91440" rIns="91440" anchor="t" anchorCtr="0">
             <a:normAutofit/>
           </a:bodyPr>
           <a:lstStyle>
             <a:lvl1pPr marL="0" indent="0">
               <a:buNone/>
-              <a:defRPr sz="2200" cap="none" spc="0" baseline="0">
+              <a:defRPr sz="2400" cap="all" spc="200" baseline="0">
                 <a:solidFill>
-                  <a:schemeClr val="tx1">
-                    <a:lumMod val="65000"/>
-                    <a:lumOff val="35000"/>
-                  </a:schemeClr>
+                  <a:schemeClr val="tx2"/>
                 </a:solidFill>
+                <a:latin typeface="+mj-lt"/>
               </a:defRPr>
             </a:lvl1pPr>
             <a:lvl2pPr marL="457200" indent="0">
@@ -1112,7 +1318,7 @@
           <a:p>
             <a:fld id="{4A1D9E61-7A34-4455-A944-7760DD9E2D94}" type="datetimeFigureOut">
               <a:rPr lang="en-US" smtClean="0"/>
-              <a:t>4/7/2022</a:t>
+              <a:t>4/12/2022</a:t>
             </a:fld>
             <a:endParaRPr lang="en-US"/>
           </a:p>
@@ -1160,10 +1366,48 @@
           </a:p>
         </p:txBody>
       </p:sp>
+      <p:cxnSp>
+        <p:nvCxnSpPr>
+          <p:cNvPr id="9" name="Straight Connector 8"/>
+          <p:cNvCxnSpPr/>
+          <p:nvPr/>
+        </p:nvCxnSpPr>
+        <p:spPr>
+          <a:xfrm>
+            <a:off x="1207658" y="4343400"/>
+            <a:ext cx="9875520" cy="0"/>
+          </a:xfrm>
+          <a:prstGeom prst="line">
+            <a:avLst/>
+          </a:prstGeom>
+          <a:ln w="6350">
+            <a:solidFill>
+              <a:schemeClr val="tx1">
+                <a:lumMod val="50000"/>
+                <a:lumOff val="50000"/>
+              </a:schemeClr>
+            </a:solidFill>
+          </a:ln>
+        </p:spPr>
+        <p:style>
+          <a:lnRef idx="1">
+            <a:schemeClr val="accent1"/>
+          </a:lnRef>
+          <a:fillRef idx="0">
+            <a:schemeClr val="accent1"/>
+          </a:fillRef>
+          <a:effectRef idx="0">
+            <a:schemeClr val="accent1"/>
+          </a:effectRef>
+          <a:fontRef idx="minor">
+            <a:schemeClr val="tx1"/>
+          </a:fontRef>
+        </p:style>
+      </p:cxnSp>
     </p:spTree>
     <p:extLst>
       <p:ext uri="{BB962C8B-B14F-4D97-AF65-F5344CB8AC3E}">
-        <p14:creationId xmlns:p14="http://schemas.microsoft.com/office/powerpoint/2010/main" val="2736919571"/>
+        <p14:creationId xmlns:p14="http://schemas.microsoft.com/office/powerpoint/2010/main" val="1731342575"/>
       </p:ext>
     </p:extLst>
   </p:cSld>
@@ -1192,7 +1436,7 @@
       </p:grpSpPr>
       <p:sp>
         <p:nvSpPr>
-          <p:cNvPr id="2" name="Title 1"/>
+          <p:cNvPr id="8" name="Title 7"/>
           <p:cNvSpPr>
             <a:spLocks noGrp="1"/>
           </p:cNvSpPr>
@@ -1200,7 +1444,12 @@
             <p:ph type="title"/>
           </p:nvPr>
         </p:nvSpPr>
-        <p:spPr/>
+        <p:spPr>
+          <a:xfrm>
+            <a:off x="1097280" y="286603"/>
+            <a:ext cx="10058400" cy="1450757"/>
+          </a:xfrm>
+        </p:spPr>
         <p:txBody>
           <a:bodyPr/>
           <a:lstStyle/>
@@ -1225,41 +1474,13 @@
         </p:nvSpPr>
         <p:spPr>
           <a:xfrm>
-            <a:off x="3867912" y="868680"/>
-            <a:ext cx="3474720" cy="5120640"/>
+            <a:off x="1097280" y="1845734"/>
+            <a:ext cx="4937760" cy="4023359"/>
           </a:xfrm>
         </p:spPr>
         <p:txBody>
           <a:bodyPr/>
-          <a:lstStyle>
-            <a:lvl1pPr>
-              <a:defRPr sz="2000"/>
-            </a:lvl1pPr>
-            <a:lvl2pPr>
-              <a:defRPr sz="1800"/>
-            </a:lvl2pPr>
-            <a:lvl3pPr>
-              <a:defRPr sz="1600"/>
-            </a:lvl3pPr>
-            <a:lvl4pPr>
-              <a:defRPr sz="1400"/>
-            </a:lvl4pPr>
-            <a:lvl5pPr>
-              <a:defRPr sz="1400"/>
-            </a:lvl5pPr>
-            <a:lvl6pPr>
-              <a:defRPr sz="1400"/>
-            </a:lvl6pPr>
-            <a:lvl7pPr>
-              <a:defRPr sz="1400"/>
-            </a:lvl7pPr>
-            <a:lvl8pPr>
-              <a:defRPr sz="1400"/>
-            </a:lvl8pPr>
-            <a:lvl9pPr>
-              <a:defRPr sz="1400"/>
-            </a:lvl9pPr>
-          </a:lstStyle>
+          <a:lstStyle/>
           <a:p>
             <a:pPr lvl="0"/>
             <a:r>
@@ -1310,41 +1531,13 @@
         </p:nvSpPr>
         <p:spPr>
           <a:xfrm>
-            <a:off x="7818120" y="868680"/>
-            <a:ext cx="3474720" cy="5120640"/>
+            <a:off x="6217920" y="1845735"/>
+            <a:ext cx="4937760" cy="4023360"/>
           </a:xfrm>
         </p:spPr>
         <p:txBody>
           <a:bodyPr/>
-          <a:lstStyle>
-            <a:lvl1pPr>
-              <a:defRPr sz="2000"/>
-            </a:lvl1pPr>
-            <a:lvl2pPr>
-              <a:defRPr sz="1800"/>
-            </a:lvl2pPr>
-            <a:lvl3pPr>
-              <a:defRPr sz="1600"/>
-            </a:lvl3pPr>
-            <a:lvl4pPr>
-              <a:defRPr sz="1400"/>
-            </a:lvl4pPr>
-            <a:lvl5pPr>
-              <a:defRPr sz="1400"/>
-            </a:lvl5pPr>
-            <a:lvl6pPr>
-              <a:defRPr sz="1400"/>
-            </a:lvl6pPr>
-            <a:lvl7pPr>
-              <a:defRPr sz="1400"/>
-            </a:lvl7pPr>
-            <a:lvl8pPr>
-              <a:defRPr sz="1400"/>
-            </a:lvl8pPr>
-            <a:lvl9pPr>
-              <a:defRPr sz="1400"/>
-            </a:lvl9pPr>
-          </a:lstStyle>
+          <a:lstStyle/>
           <a:p>
             <a:pPr lvl="0"/>
             <a:r>
@@ -1385,7 +1578,7 @@
       </p:sp>
       <p:sp>
         <p:nvSpPr>
-          <p:cNvPr id="8" name="Date Placeholder 7"/>
+          <p:cNvPr id="5" name="Date Placeholder 4"/>
           <p:cNvSpPr>
             <a:spLocks noGrp="1"/>
           </p:cNvSpPr>
@@ -1400,7 +1593,7 @@
           <a:p>
             <a:fld id="{4A1D9E61-7A34-4455-A944-7760DD9E2D94}" type="datetimeFigureOut">
               <a:rPr lang="en-US" smtClean="0"/>
-              <a:t>4/7/2022</a:t>
+              <a:t>4/12/2022</a:t>
             </a:fld>
             <a:endParaRPr lang="en-US"/>
           </a:p>
@@ -1408,7 +1601,7 @@
       </p:sp>
       <p:sp>
         <p:nvSpPr>
-          <p:cNvPr id="9" name="Footer Placeholder 8"/>
+          <p:cNvPr id="6" name="Footer Placeholder 5"/>
           <p:cNvSpPr>
             <a:spLocks noGrp="1"/>
           </p:cNvSpPr>
@@ -1427,7 +1620,7 @@
       </p:sp>
       <p:sp>
         <p:nvSpPr>
-          <p:cNvPr id="10" name="Slide Number Placeholder 9"/>
+          <p:cNvPr id="7" name="Slide Number Placeholder 6"/>
           <p:cNvSpPr>
             <a:spLocks noGrp="1"/>
           </p:cNvSpPr>
@@ -1451,7 +1644,7 @@
     </p:spTree>
     <p:extLst>
       <p:ext uri="{BB962C8B-B14F-4D97-AF65-F5344CB8AC3E}">
-        <p14:creationId xmlns:p14="http://schemas.microsoft.com/office/powerpoint/2010/main" val="755031926"/>
+        <p14:creationId xmlns:p14="http://schemas.microsoft.com/office/powerpoint/2010/main" val="579106640"/>
       </p:ext>
     </p:extLst>
   </p:cSld>
@@ -1488,7 +1681,12 @@
             <p:ph type="title"/>
           </p:nvPr>
         </p:nvSpPr>
-        <p:spPr/>
+        <p:spPr>
+          <a:xfrm>
+            <a:off x="1097280" y="286603"/>
+            <a:ext cx="10058400" cy="1450757"/>
+          </a:xfrm>
+        </p:spPr>
         <p:txBody>
           <a:bodyPr/>
           <a:lstStyle/>
@@ -1513,26 +1711,20 @@
         </p:nvSpPr>
         <p:spPr>
           <a:xfrm>
-            <a:off x="3867912" y="1023586"/>
-            <a:ext cx="3474720" cy="807720"/>
-          </a:xfrm>
-        </p:spPr>
-        <p:txBody>
-          <a:bodyPr anchor="b">
+            <a:off x="1097280" y="1846052"/>
+            <a:ext cx="4937760" cy="736282"/>
+          </a:xfrm>
+        </p:spPr>
+        <p:txBody>
+          <a:bodyPr lIns="91440" rIns="91440" anchor="ctr">
             <a:normAutofit/>
           </a:bodyPr>
           <a:lstStyle>
             <a:lvl1pPr marL="0" indent="0">
-              <a:spcBef>
-                <a:spcPts val="0"/>
-              </a:spcBef>
-              <a:buNone/>
-              <a:defRPr sz="2000" b="1">
+              <a:buNone/>
+              <a:defRPr sz="2000" b="0" cap="all" baseline="0">
                 <a:solidFill>
-                  <a:schemeClr val="tx1">
-                    <a:lumMod val="65000"/>
-                    <a:lumOff val="35000"/>
-                  </a:schemeClr>
+                  <a:schemeClr val="tx2"/>
                 </a:solidFill>
               </a:defRPr>
             </a:lvl1pPr>
@@ -1590,41 +1782,13 @@
         </p:nvSpPr>
         <p:spPr>
           <a:xfrm>
-            <a:off x="3867912" y="1930936"/>
-            <a:ext cx="3474720" cy="4023360"/>
+            <a:off x="1097280" y="2582335"/>
+            <a:ext cx="4937760" cy="3286760"/>
           </a:xfrm>
         </p:spPr>
         <p:txBody>
           <a:bodyPr/>
-          <a:lstStyle>
-            <a:lvl1pPr>
-              <a:defRPr sz="2000"/>
-            </a:lvl1pPr>
-            <a:lvl2pPr>
-              <a:defRPr sz="1800"/>
-            </a:lvl2pPr>
-            <a:lvl3pPr>
-              <a:defRPr sz="1600"/>
-            </a:lvl3pPr>
-            <a:lvl4pPr>
-              <a:defRPr sz="1400"/>
-            </a:lvl4pPr>
-            <a:lvl5pPr>
-              <a:defRPr sz="1400"/>
-            </a:lvl5pPr>
-            <a:lvl6pPr>
-              <a:defRPr sz="1400"/>
-            </a:lvl6pPr>
-            <a:lvl7pPr>
-              <a:defRPr sz="1400"/>
-            </a:lvl7pPr>
-            <a:lvl8pPr>
-              <a:defRPr sz="1400"/>
-            </a:lvl8pPr>
-            <a:lvl9pPr>
-              <a:defRPr sz="1400"/>
-            </a:lvl9pPr>
-          </a:lstStyle>
+          <a:lstStyle/>
           <a:p>
             <a:pPr lvl="0"/>
             <a:r>
@@ -1675,26 +1839,20 @@
         </p:nvSpPr>
         <p:spPr>
           <a:xfrm>
-            <a:off x="7818463" y="1023586"/>
-            <a:ext cx="3474720" cy="813171"/>
-          </a:xfrm>
-        </p:spPr>
-        <p:txBody>
-          <a:bodyPr anchor="b">
+            <a:off x="6217920" y="1846052"/>
+            <a:ext cx="4937760" cy="736282"/>
+          </a:xfrm>
+        </p:spPr>
+        <p:txBody>
+          <a:bodyPr lIns="91440" rIns="91440" anchor="ctr">
             <a:normAutofit/>
           </a:bodyPr>
           <a:lstStyle>
             <a:lvl1pPr marL="0" indent="0">
-              <a:spcBef>
-                <a:spcPts val="0"/>
-              </a:spcBef>
-              <a:buNone/>
-              <a:defRPr sz="2000" b="1">
+              <a:buNone/>
+              <a:defRPr sz="2000" b="0" cap="all" baseline="0">
                 <a:solidFill>
-                  <a:schemeClr val="tx1">
-                    <a:lumMod val="65000"/>
-                    <a:lumOff val="35000"/>
-                  </a:schemeClr>
+                  <a:schemeClr val="tx2"/>
                 </a:solidFill>
               </a:defRPr>
             </a:lvl1pPr>
@@ -1752,41 +1910,13 @@
         </p:nvSpPr>
         <p:spPr>
           <a:xfrm>
-            <a:off x="7818463" y="1930936"/>
-            <a:ext cx="3474720" cy="4023360"/>
+            <a:off x="6217920" y="2582334"/>
+            <a:ext cx="4937760" cy="3286760"/>
           </a:xfrm>
         </p:spPr>
         <p:txBody>
           <a:bodyPr/>
-          <a:lstStyle>
-            <a:lvl1pPr>
-              <a:defRPr sz="2000"/>
-            </a:lvl1pPr>
-            <a:lvl2pPr>
-              <a:defRPr sz="1800"/>
-            </a:lvl2pPr>
-            <a:lvl3pPr>
-              <a:defRPr sz="1600"/>
-            </a:lvl3pPr>
-            <a:lvl4pPr>
-              <a:defRPr sz="1400"/>
-            </a:lvl4pPr>
-            <a:lvl5pPr>
-              <a:defRPr sz="1400"/>
-            </a:lvl5pPr>
-            <a:lvl6pPr>
-              <a:defRPr sz="1400"/>
-            </a:lvl6pPr>
-            <a:lvl7pPr>
-              <a:defRPr sz="1400"/>
-            </a:lvl7pPr>
-            <a:lvl8pPr>
-              <a:defRPr sz="1400"/>
-            </a:lvl8pPr>
-            <a:lvl9pPr>
-              <a:defRPr sz="1400"/>
-            </a:lvl9pPr>
-          </a:lstStyle>
+          <a:lstStyle/>
           <a:p>
             <a:pPr lvl="0"/>
             <a:r>
@@ -1827,7 +1957,7 @@
       </p:sp>
       <p:sp>
         <p:nvSpPr>
-          <p:cNvPr id="2" name="Date Placeholder 1"/>
+          <p:cNvPr id="7" name="Date Placeholder 6"/>
           <p:cNvSpPr>
             <a:spLocks noGrp="1"/>
           </p:cNvSpPr>
@@ -1842,7 +1972,7 @@
           <a:p>
             <a:fld id="{4A1D9E61-7A34-4455-A944-7760DD9E2D94}" type="datetimeFigureOut">
               <a:rPr lang="en-US" smtClean="0"/>
-              <a:t>4/7/2022</a:t>
+              <a:t>4/12/2022</a:t>
             </a:fld>
             <a:endParaRPr lang="en-US"/>
           </a:p>
@@ -1850,7 +1980,7 @@
       </p:sp>
       <p:sp>
         <p:nvSpPr>
-          <p:cNvPr id="11" name="Footer Placeholder 10"/>
+          <p:cNvPr id="8" name="Footer Placeholder 7"/>
           <p:cNvSpPr>
             <a:spLocks noGrp="1"/>
           </p:cNvSpPr>
@@ -1869,7 +1999,7 @@
       </p:sp>
       <p:sp>
         <p:nvSpPr>
-          <p:cNvPr id="12" name="Slide Number Placeholder 11"/>
+          <p:cNvPr id="9" name="Slide Number Placeholder 8"/>
           <p:cNvSpPr>
             <a:spLocks noGrp="1"/>
           </p:cNvSpPr>
@@ -1893,7 +2023,7 @@
     </p:spTree>
     <p:extLst>
       <p:ext uri="{BB962C8B-B14F-4D97-AF65-F5344CB8AC3E}">
-        <p14:creationId xmlns:p14="http://schemas.microsoft.com/office/powerpoint/2010/main" val="4245990399"/>
+        <p14:creationId xmlns:p14="http://schemas.microsoft.com/office/powerpoint/2010/main" val="2227669196"/>
       </p:ext>
     </p:extLst>
   </p:cSld>
@@ -1922,7 +2052,7 @@
       </p:grpSpPr>
       <p:sp>
         <p:nvSpPr>
-          <p:cNvPr id="6" name="Title 5"/>
+          <p:cNvPr id="2" name="Title 1"/>
           <p:cNvSpPr>
             <a:spLocks noGrp="1"/>
           </p:cNvSpPr>
@@ -1945,7 +2075,7 @@
       </p:sp>
       <p:sp>
         <p:nvSpPr>
-          <p:cNvPr id="2" name="Date Placeholder 1"/>
+          <p:cNvPr id="3" name="Date Placeholder 2"/>
           <p:cNvSpPr>
             <a:spLocks noGrp="1"/>
           </p:cNvSpPr>
@@ -1960,7 +2090,7 @@
           <a:p>
             <a:fld id="{4A1D9E61-7A34-4455-A944-7760DD9E2D94}" type="datetimeFigureOut">
               <a:rPr lang="en-US" smtClean="0"/>
-              <a:t>4/7/2022</a:t>
+              <a:t>4/12/2022</a:t>
             </a:fld>
             <a:endParaRPr lang="en-US"/>
           </a:p>
@@ -1968,7 +2098,7 @@
       </p:sp>
       <p:sp>
         <p:nvSpPr>
-          <p:cNvPr id="7" name="Footer Placeholder 6"/>
+          <p:cNvPr id="4" name="Footer Placeholder 3"/>
           <p:cNvSpPr>
             <a:spLocks noGrp="1"/>
           </p:cNvSpPr>
@@ -1987,7 +2117,7 @@
       </p:sp>
       <p:sp>
         <p:nvSpPr>
-          <p:cNvPr id="8" name="Slide Number Placeholder 7"/>
+          <p:cNvPr id="5" name="Slide Number Placeholder 4"/>
           <p:cNvSpPr>
             <a:spLocks noGrp="1"/>
           </p:cNvSpPr>
@@ -2011,7 +2141,7 @@
     </p:spTree>
     <p:extLst>
       <p:ext uri="{BB962C8B-B14F-4D97-AF65-F5344CB8AC3E}">
-        <p14:creationId xmlns:p14="http://schemas.microsoft.com/office/powerpoint/2010/main" val="654913810"/>
+        <p14:creationId xmlns:p14="http://schemas.microsoft.com/office/powerpoint/2010/main" val="3996325632"/>
       </p:ext>
     </p:extLst>
   </p:cSld>
@@ -2040,7 +2170,83 @@
       </p:grpSpPr>
       <p:sp>
         <p:nvSpPr>
-          <p:cNvPr id="5" name="Date Placeholder 4"/>
+          <p:cNvPr id="5" name="Rectangle 4"/>
+          <p:cNvSpPr/>
+          <p:nvPr/>
+        </p:nvSpPr>
+        <p:spPr>
+          <a:xfrm>
+            <a:off x="3175" y="6400800"/>
+            <a:ext cx="12188825" cy="457200"/>
+          </a:xfrm>
+          <a:prstGeom prst="rect">
+            <a:avLst/>
+          </a:prstGeom>
+          <a:solidFill>
+            <a:schemeClr val="accent2"/>
+          </a:solidFill>
+          <a:ln>
+            <a:noFill/>
+          </a:ln>
+        </p:spPr>
+        <p:style>
+          <a:lnRef idx="2">
+            <a:schemeClr val="accent1">
+              <a:shade val="50000"/>
+            </a:schemeClr>
+          </a:lnRef>
+          <a:fillRef idx="1">
+            <a:schemeClr val="accent1"/>
+          </a:fillRef>
+          <a:effectRef idx="0">
+            <a:schemeClr val="accent1"/>
+          </a:effectRef>
+          <a:fontRef idx="minor">
+            <a:schemeClr val="lt1"/>
+          </a:fontRef>
+        </p:style>
+      </p:sp>
+      <p:sp>
+        <p:nvSpPr>
+          <p:cNvPr id="6" name="Rectangle 5"/>
+          <p:cNvSpPr/>
+          <p:nvPr/>
+        </p:nvSpPr>
+        <p:spPr>
+          <a:xfrm>
+            <a:off x="15" y="6334316"/>
+            <a:ext cx="12188825" cy="64008"/>
+          </a:xfrm>
+          <a:prstGeom prst="rect">
+            <a:avLst/>
+          </a:prstGeom>
+          <a:solidFill>
+            <a:schemeClr val="accent1"/>
+          </a:solidFill>
+          <a:ln>
+            <a:noFill/>
+          </a:ln>
+        </p:spPr>
+        <p:style>
+          <a:lnRef idx="2">
+            <a:schemeClr val="accent1">
+              <a:shade val="50000"/>
+            </a:schemeClr>
+          </a:lnRef>
+          <a:fillRef idx="1">
+            <a:schemeClr val="accent1"/>
+          </a:fillRef>
+          <a:effectRef idx="0">
+            <a:schemeClr val="accent1"/>
+          </a:effectRef>
+          <a:fontRef idx="minor">
+            <a:schemeClr val="lt1"/>
+          </a:fontRef>
+        </p:style>
+      </p:sp>
+      <p:sp>
+        <p:nvSpPr>
+          <p:cNvPr id="7" name="Date Placeholder 6"/>
           <p:cNvSpPr>
             <a:spLocks noGrp="1"/>
           </p:cNvSpPr>
@@ -2055,7 +2261,7 @@
           <a:p>
             <a:fld id="{4A1D9E61-7A34-4455-A944-7760DD9E2D94}" type="datetimeFigureOut">
               <a:rPr lang="en-US" smtClean="0"/>
-              <a:t>4/7/2022</a:t>
+              <a:t>4/12/2022</a:t>
             </a:fld>
             <a:endParaRPr lang="en-US"/>
           </a:p>
@@ -2063,7 +2269,7 @@
       </p:sp>
       <p:sp>
         <p:nvSpPr>
-          <p:cNvPr id="6" name="Footer Placeholder 5"/>
+          <p:cNvPr id="8" name="Footer Placeholder 7"/>
           <p:cNvSpPr>
             <a:spLocks noGrp="1"/>
           </p:cNvSpPr>
@@ -2074,7 +2280,15 @@
         <p:spPr/>
         <p:txBody>
           <a:bodyPr/>
-          <a:lstStyle/>
+          <a:lstStyle>
+            <a:lvl1pPr>
+              <a:defRPr>
+                <a:solidFill>
+                  <a:srgbClr val="FFFFFF"/>
+                </a:solidFill>
+              </a:defRPr>
+            </a:lvl1pPr>
+          </a:lstStyle>
           <a:p>
             <a:endParaRPr lang="en-US"/>
           </a:p>
@@ -2082,7 +2296,7 @@
       </p:sp>
       <p:sp>
         <p:nvSpPr>
-          <p:cNvPr id="7" name="Slide Number Placeholder 6"/>
+          <p:cNvPr id="9" name="Slide Number Placeholder 8"/>
           <p:cNvSpPr>
             <a:spLocks noGrp="1"/>
           </p:cNvSpPr>
@@ -2106,7 +2320,7 @@
     </p:spTree>
     <p:extLst>
       <p:ext uri="{BB962C8B-B14F-4D97-AF65-F5344CB8AC3E}">
-        <p14:creationId xmlns:p14="http://schemas.microsoft.com/office/powerpoint/2010/main" val="1569383421"/>
+        <p14:creationId xmlns:p14="http://schemas.microsoft.com/office/powerpoint/2010/main" val="3661886901"/>
       </p:ext>
     </p:extLst>
   </p:cSld>
@@ -2117,7 +2331,7 @@
 </file>
 
 <file path=ppt/slideLayouts/slideLayout8.xml><?xml version="1.0" encoding="utf-8"?>
-<p:sldLayout xmlns:a="http://schemas.openxmlformats.org/drawingml/2006/main" xmlns:r="http://schemas.openxmlformats.org/officeDocument/2006/relationships" xmlns:p="http://schemas.openxmlformats.org/presentationml/2006/main" type="objTx" preserve="1">
+<p:sldLayout xmlns:a="http://schemas.openxmlformats.org/drawingml/2006/main" xmlns:r="http://schemas.openxmlformats.org/officeDocument/2006/relationships" xmlns:p="http://schemas.openxmlformats.org/presentationml/2006/main" showMasterSp="0" type="objTx" preserve="1">
   <p:cSld name="Content with Caption">
     <p:spTree>
       <p:nvGrpSpPr>
@@ -2135,6 +2349,82 @@
       </p:grpSpPr>
       <p:sp>
         <p:nvSpPr>
+          <p:cNvPr id="8" name="Rectangle 7"/>
+          <p:cNvSpPr/>
+          <p:nvPr/>
+        </p:nvSpPr>
+        <p:spPr>
+          <a:xfrm>
+            <a:off x="16" y="0"/>
+            <a:ext cx="4050791" cy="6858000"/>
+          </a:xfrm>
+          <a:prstGeom prst="rect">
+            <a:avLst/>
+          </a:prstGeom>
+          <a:solidFill>
+            <a:schemeClr val="accent2"/>
+          </a:solidFill>
+          <a:ln>
+            <a:noFill/>
+          </a:ln>
+        </p:spPr>
+        <p:style>
+          <a:lnRef idx="2">
+            <a:schemeClr val="accent1">
+              <a:shade val="50000"/>
+            </a:schemeClr>
+          </a:lnRef>
+          <a:fillRef idx="1">
+            <a:schemeClr val="accent1"/>
+          </a:fillRef>
+          <a:effectRef idx="0">
+            <a:schemeClr val="accent1"/>
+          </a:effectRef>
+          <a:fontRef idx="minor">
+            <a:schemeClr val="lt1"/>
+          </a:fontRef>
+        </p:style>
+      </p:sp>
+      <p:sp>
+        <p:nvSpPr>
+          <p:cNvPr id="9" name="Rectangle 8"/>
+          <p:cNvSpPr/>
+          <p:nvPr/>
+        </p:nvSpPr>
+        <p:spPr>
+          <a:xfrm>
+            <a:off x="4040071" y="0"/>
+            <a:ext cx="64008" cy="6858000"/>
+          </a:xfrm>
+          <a:prstGeom prst="rect">
+            <a:avLst/>
+          </a:prstGeom>
+          <a:solidFill>
+            <a:schemeClr val="accent1"/>
+          </a:solidFill>
+          <a:ln>
+            <a:noFill/>
+          </a:ln>
+        </p:spPr>
+        <p:style>
+          <a:lnRef idx="2">
+            <a:schemeClr val="accent1">
+              <a:shade val="50000"/>
+            </a:schemeClr>
+          </a:lnRef>
+          <a:fillRef idx="1">
+            <a:schemeClr val="accent1"/>
+          </a:fillRef>
+          <a:effectRef idx="0">
+            <a:schemeClr val="accent1"/>
+          </a:effectRef>
+          <a:fontRef idx="minor">
+            <a:schemeClr val="lt1"/>
+          </a:fontRef>
+        </p:style>
+      </p:sp>
+      <p:sp>
+        <p:nvSpPr>
           <p:cNvPr id="2" name="Title 1"/>
           <p:cNvSpPr>
             <a:spLocks noGrp="1"/>
@@ -2145,8 +2435,8 @@
         </p:nvSpPr>
         <p:spPr>
           <a:xfrm>
-            <a:off x="256032" y="1143000"/>
-            <a:ext cx="2834640" cy="2377440"/>
+            <a:off x="457200" y="594359"/>
+            <a:ext cx="3200400" cy="2286000"/>
           </a:xfrm>
         </p:spPr>
         <p:txBody>
@@ -2155,7 +2445,11 @@
           </a:bodyPr>
           <a:lstStyle>
             <a:lvl1pPr>
-              <a:defRPr sz="3200" b="0" baseline="0"/>
+              <a:defRPr sz="3600" b="0">
+                <a:solidFill>
+                  <a:srgbClr val="FFFFFF"/>
+                </a:solidFill>
+              </a:defRPr>
             </a:lvl1pPr>
           </a:lstStyle>
           <a:p>
@@ -2179,41 +2473,13 @@
         </p:nvSpPr>
         <p:spPr>
           <a:xfrm>
-            <a:off x="3867912" y="868680"/>
-            <a:ext cx="7315200" cy="5120640"/>
+            <a:off x="4800600" y="731520"/>
+            <a:ext cx="6492240" cy="5257800"/>
           </a:xfrm>
         </p:spPr>
         <p:txBody>
           <a:bodyPr/>
-          <a:lstStyle>
-            <a:lvl1pPr>
-              <a:defRPr sz="2000"/>
-            </a:lvl1pPr>
-            <a:lvl2pPr>
-              <a:defRPr sz="1800"/>
-            </a:lvl2pPr>
-            <a:lvl3pPr>
-              <a:defRPr sz="1600"/>
-            </a:lvl3pPr>
-            <a:lvl4pPr>
-              <a:defRPr sz="1400"/>
-            </a:lvl4pPr>
-            <a:lvl5pPr>
-              <a:defRPr sz="1400"/>
-            </a:lvl5pPr>
-            <a:lvl6pPr>
-              <a:defRPr sz="1400"/>
-            </a:lvl6pPr>
-            <a:lvl7pPr>
-              <a:defRPr sz="1400"/>
-            </a:lvl7pPr>
-            <a:lvl8pPr>
-              <a:defRPr sz="1400"/>
-            </a:lvl8pPr>
-            <a:lvl9pPr>
-              <a:defRPr sz="1400"/>
-            </a:lvl9pPr>
-          </a:lstStyle>
+          <a:lstStyle/>
           <a:p>
             <a:pPr lvl="0"/>
             <a:r>
@@ -2264,21 +2530,18 @@
         </p:nvSpPr>
         <p:spPr>
           <a:xfrm>
-            <a:off x="256032" y="3494176"/>
-            <a:ext cx="2834640" cy="2321990"/>
-          </a:xfrm>
-        </p:spPr>
-        <p:txBody>
-          <a:bodyPr anchor="t">
+            <a:off x="457200" y="2926080"/>
+            <a:ext cx="3200400" cy="3379124"/>
+          </a:xfrm>
+        </p:spPr>
+        <p:txBody>
+          <a:bodyPr lIns="91440" rIns="91440">
             <a:normAutofit/>
           </a:bodyPr>
           <a:lstStyle>
             <a:lvl1pPr marL="0" indent="0">
-              <a:lnSpc>
-                <a:spcPct val="100000"/>
-              </a:lnSpc>
-              <a:buNone/>
-              <a:defRPr sz="1400">
+              <a:buNone/>
+              <a:defRPr sz="1500">
                 <a:solidFill>
                   <a:srgbClr val="FFFFFF"/>
                 </a:solidFill>
@@ -2328,7 +2591,7 @@
       </p:sp>
       <p:sp>
         <p:nvSpPr>
-          <p:cNvPr id="8" name="Date Placeholder 7"/>
+          <p:cNvPr id="5" name="Date Placeholder 4"/>
           <p:cNvSpPr>
             <a:spLocks noGrp="1"/>
           </p:cNvSpPr>
@@ -2336,14 +2599,23 @@
             <p:ph type="dt" sz="half" idx="10"/>
           </p:nvPr>
         </p:nvSpPr>
-        <p:spPr/>
+        <p:spPr>
+          <a:xfrm>
+            <a:off x="465512" y="6459785"/>
+            <a:ext cx="2618510" cy="365125"/>
+          </a:xfrm>
+        </p:spPr>
         <p:txBody>
           <a:bodyPr/>
-          <a:lstStyle/>
+          <a:lstStyle>
+            <a:lvl1pPr algn="l">
+              <a:defRPr/>
+            </a:lvl1pPr>
+          </a:lstStyle>
           <a:p>
             <a:fld id="{4A1D9E61-7A34-4455-A944-7760DD9E2D94}" type="datetimeFigureOut">
               <a:rPr lang="en-US" smtClean="0"/>
-              <a:t>4/7/2022</a:t>
+              <a:t>4/12/2022</a:t>
             </a:fld>
             <a:endParaRPr lang="en-US"/>
           </a:p>
@@ -2351,7 +2623,7 @@
       </p:sp>
       <p:sp>
         <p:nvSpPr>
-          <p:cNvPr id="9" name="Footer Placeholder 8"/>
+          <p:cNvPr id="6" name="Footer Placeholder 5"/>
           <p:cNvSpPr>
             <a:spLocks noGrp="1"/>
           </p:cNvSpPr>
@@ -2359,29 +2631,50 @@
             <p:ph type="ftr" sz="quarter" idx="11"/>
           </p:nvPr>
         </p:nvSpPr>
+        <p:spPr>
+          <a:xfrm>
+            <a:off x="4800600" y="6459785"/>
+            <a:ext cx="4648200" cy="365125"/>
+          </a:xfrm>
+        </p:spPr>
+        <p:txBody>
+          <a:bodyPr/>
+          <a:lstStyle>
+            <a:lvl1pPr algn="l">
+              <a:defRPr>
+                <a:solidFill>
+                  <a:schemeClr val="tx2"/>
+                </a:solidFill>
+              </a:defRPr>
+            </a:lvl1pPr>
+          </a:lstStyle>
+          <a:p>
+            <a:endParaRPr lang="en-US"/>
+          </a:p>
+        </p:txBody>
+      </p:sp>
+      <p:sp>
+        <p:nvSpPr>
+          <p:cNvPr id="7" name="Slide Number Placeholder 6"/>
+          <p:cNvSpPr>
+            <a:spLocks noGrp="1"/>
+          </p:cNvSpPr>
+          <p:nvPr>
+            <p:ph type="sldNum" sz="quarter" idx="12"/>
+          </p:nvPr>
+        </p:nvSpPr>
         <p:spPr/>
         <p:txBody>
           <a:bodyPr/>
-          <a:lstStyle/>
-          <a:p>
-            <a:endParaRPr lang="en-US"/>
-          </a:p>
-        </p:txBody>
-      </p:sp>
-      <p:sp>
-        <p:nvSpPr>
-          <p:cNvPr id="10" name="Slide Number Placeholder 9"/>
-          <p:cNvSpPr>
-            <a:spLocks noGrp="1"/>
-          </p:cNvSpPr>
-          <p:nvPr>
-            <p:ph type="sldNum" sz="quarter" idx="12"/>
-          </p:nvPr>
-        </p:nvSpPr>
-        <p:spPr/>
-        <p:txBody>
-          <a:bodyPr/>
-          <a:lstStyle/>
+          <a:lstStyle>
+            <a:lvl1pPr>
+              <a:defRPr>
+                <a:solidFill>
+                  <a:schemeClr val="tx2"/>
+                </a:solidFill>
+              </a:defRPr>
+            </a:lvl1pPr>
+          </a:lstStyle>
           <a:p>
             <a:fld id="{DD5F2AF8-3C1A-4559-BBC5-7EC34A8422A9}" type="slidenum">
               <a:rPr lang="en-US" smtClean="0"/>
@@ -2394,7 +2687,7 @@
     </p:spTree>
     <p:extLst>
       <p:ext uri="{BB962C8B-B14F-4D97-AF65-F5344CB8AC3E}">
-        <p14:creationId xmlns:p14="http://schemas.microsoft.com/office/powerpoint/2010/main" val="1636638891"/>
+        <p14:creationId xmlns:p14="http://schemas.microsoft.com/office/powerpoint/2010/main" val="841576645"/>
       </p:ext>
     </p:extLst>
   </p:cSld>
@@ -2405,7 +2698,7 @@
 </file>
 
 <file path=ppt/slideLayouts/slideLayout9.xml><?xml version="1.0" encoding="utf-8"?>
-<p:sldLayout xmlns:a="http://schemas.openxmlformats.org/drawingml/2006/main" xmlns:r="http://schemas.openxmlformats.org/officeDocument/2006/relationships" xmlns:p="http://schemas.openxmlformats.org/presentationml/2006/main" type="picTx" preserve="1">
+<p:sldLayout xmlns:a="http://schemas.openxmlformats.org/drawingml/2006/main" xmlns:r="http://schemas.openxmlformats.org/officeDocument/2006/relationships" xmlns:p="http://schemas.openxmlformats.org/presentationml/2006/main" showMasterSp="0" type="picTx" preserve="1">
   <p:cSld name="Picture with Caption">
     <p:spTree>
       <p:nvGrpSpPr>
@@ -2423,6 +2716,82 @@
       </p:grpSpPr>
       <p:sp>
         <p:nvSpPr>
+          <p:cNvPr id="8" name="Rectangle 7"/>
+          <p:cNvSpPr/>
+          <p:nvPr/>
+        </p:nvSpPr>
+        <p:spPr>
+          <a:xfrm>
+            <a:off x="0" y="4953000"/>
+            <a:ext cx="12188825" cy="1905000"/>
+          </a:xfrm>
+          <a:prstGeom prst="rect">
+            <a:avLst/>
+          </a:prstGeom>
+          <a:solidFill>
+            <a:schemeClr val="accent2"/>
+          </a:solidFill>
+          <a:ln>
+            <a:noFill/>
+          </a:ln>
+        </p:spPr>
+        <p:style>
+          <a:lnRef idx="2">
+            <a:schemeClr val="accent1">
+              <a:shade val="50000"/>
+            </a:schemeClr>
+          </a:lnRef>
+          <a:fillRef idx="1">
+            <a:schemeClr val="accent1"/>
+          </a:fillRef>
+          <a:effectRef idx="0">
+            <a:schemeClr val="accent1"/>
+          </a:effectRef>
+          <a:fontRef idx="minor">
+            <a:schemeClr val="lt1"/>
+          </a:fontRef>
+        </p:style>
+      </p:sp>
+      <p:sp>
+        <p:nvSpPr>
+          <p:cNvPr id="9" name="Rectangle 8"/>
+          <p:cNvSpPr/>
+          <p:nvPr/>
+        </p:nvSpPr>
+        <p:spPr>
+          <a:xfrm>
+            <a:off x="15" y="4915076"/>
+            <a:ext cx="12188825" cy="64008"/>
+          </a:xfrm>
+          <a:prstGeom prst="rect">
+            <a:avLst/>
+          </a:prstGeom>
+          <a:solidFill>
+            <a:schemeClr val="accent1"/>
+          </a:solidFill>
+          <a:ln>
+            <a:noFill/>
+          </a:ln>
+        </p:spPr>
+        <p:style>
+          <a:lnRef idx="2">
+            <a:schemeClr val="accent1">
+              <a:shade val="50000"/>
+            </a:schemeClr>
+          </a:lnRef>
+          <a:fillRef idx="1">
+            <a:schemeClr val="accent1"/>
+          </a:fillRef>
+          <a:effectRef idx="0">
+            <a:schemeClr val="accent1"/>
+          </a:effectRef>
+          <a:fontRef idx="minor">
+            <a:schemeClr val="lt1"/>
+          </a:fontRef>
+        </p:style>
+      </p:sp>
+      <p:sp>
+        <p:nvSpPr>
           <p:cNvPr id="2" name="Title 1"/>
           <p:cNvSpPr>
             <a:spLocks noGrp="1"/>
@@ -2433,17 +2802,21 @@
         </p:nvSpPr>
         <p:spPr>
           <a:xfrm>
-            <a:off x="256032" y="1143000"/>
-            <a:ext cx="2834640" cy="2377440"/>
-          </a:xfrm>
-        </p:spPr>
-        <p:txBody>
-          <a:bodyPr anchor="b">
-            <a:normAutofit/>
+            <a:off x="1097280" y="5074920"/>
+            <a:ext cx="10113645" cy="822960"/>
+          </a:xfrm>
+        </p:spPr>
+        <p:txBody>
+          <a:bodyPr tIns="0" bIns="0" anchor="b">
+            <a:noAutofit/>
           </a:bodyPr>
           <a:lstStyle>
             <a:lvl1pPr>
-              <a:defRPr sz="3200" b="0"/>
+              <a:defRPr sz="3600" b="0">
+                <a:solidFill>
+                  <a:srgbClr val="FFFFFF"/>
+                </a:solidFill>
+              </a:defRPr>
             </a:lvl1pPr>
           </a:lstStyle>
           <a:p>
@@ -2467,17 +2840,17 @@
         </p:nvSpPr>
         <p:spPr>
           <a:xfrm>
-            <a:off x="3570644" y="767419"/>
-            <a:ext cx="8115230" cy="5330952"/>
+            <a:off x="15" y="0"/>
+            <a:ext cx="12191985" cy="4915076"/>
           </a:xfrm>
           <a:solidFill>
-            <a:schemeClr val="bg1">
-              <a:lumMod val="75000"/>
+            <a:schemeClr val="bg2">
+              <a:lumMod val="90000"/>
             </a:schemeClr>
           </a:solidFill>
         </p:spPr>
         <p:txBody>
-          <a:bodyPr anchor="t"/>
+          <a:bodyPr lIns="457200" tIns="457200" anchor="t"/>
           <a:lstStyle>
             <a:lvl1pPr marL="0" indent="0">
               <a:buNone/>
@@ -2537,21 +2910,24 @@
         </p:nvSpPr>
         <p:spPr>
           <a:xfrm>
-            <a:off x="256032" y="3493008"/>
-            <a:ext cx="2834640" cy="2322576"/>
-          </a:xfrm>
-        </p:spPr>
-        <p:txBody>
-          <a:bodyPr anchor="t">
+            <a:off x="1097280" y="5907024"/>
+            <a:ext cx="10113264" cy="594360"/>
+          </a:xfrm>
+        </p:spPr>
+        <p:txBody>
+          <a:bodyPr lIns="91440" tIns="0" rIns="91440" bIns="0">
             <a:normAutofit/>
           </a:bodyPr>
           <a:lstStyle>
             <a:lvl1pPr marL="0" indent="0">
-              <a:lnSpc>
-                <a:spcPct val="100000"/>
-              </a:lnSpc>
-              <a:buNone/>
-              <a:defRPr sz="1400">
+              <a:spcBef>
+                <a:spcPts val="0"/>
+              </a:spcBef>
+              <a:spcAft>
+                <a:spcPts val="600"/>
+              </a:spcAft>
+              <a:buNone/>
+              <a:defRPr sz="1500">
                 <a:solidFill>
                   <a:srgbClr val="FFFFFF"/>
                 </a:solidFill>
@@ -2601,7 +2977,7 @@
       </p:sp>
       <p:sp>
         <p:nvSpPr>
-          <p:cNvPr id="8" name="Date Placeholder 7"/>
+          <p:cNvPr id="5" name="Date Placeholder 4"/>
           <p:cNvSpPr>
             <a:spLocks noGrp="1"/>
           </p:cNvSpPr>
@@ -2616,7 +2992,7 @@
           <a:p>
             <a:fld id="{4A1D9E61-7A34-4455-A944-7760DD9E2D94}" type="datetimeFigureOut">
               <a:rPr lang="en-US" smtClean="0"/>
-              <a:t>4/7/2022</a:t>
+              <a:t>4/12/2022</a:t>
             </a:fld>
             <a:endParaRPr lang="en-US"/>
           </a:p>
@@ -2624,7 +3000,7 @@
       </p:sp>
       <p:sp>
         <p:nvSpPr>
-          <p:cNvPr id="9" name="Footer Placeholder 8"/>
+          <p:cNvPr id="6" name="Footer Placeholder 5"/>
           <p:cNvSpPr>
             <a:spLocks noGrp="1"/>
           </p:cNvSpPr>
@@ -2632,12 +3008,7 @@
             <p:ph type="ftr" sz="quarter" idx="11"/>
           </p:nvPr>
         </p:nvSpPr>
-        <p:spPr>
-          <a:xfrm>
-            <a:off x="3499101" y="6356350"/>
-            <a:ext cx="5911517" cy="365125"/>
-          </a:xfrm>
-        </p:spPr>
+        <p:spPr/>
         <p:txBody>
           <a:bodyPr/>
           <a:lstStyle/>
@@ -2648,7 +3019,7 @@
       </p:sp>
       <p:sp>
         <p:nvSpPr>
-          <p:cNvPr id="10" name="Slide Number Placeholder 9"/>
+          <p:cNvPr id="7" name="Slide Number Placeholder 6"/>
           <p:cNvSpPr>
             <a:spLocks noGrp="1"/>
           </p:cNvSpPr>
@@ -2672,7 +3043,7 @@
     </p:spTree>
     <p:extLst>
       <p:ext uri="{BB962C8B-B14F-4D97-AF65-F5344CB8AC3E}">
-        <p14:creationId xmlns:p14="http://schemas.microsoft.com/office/powerpoint/2010/main" val="2408905932"/>
+        <p14:creationId xmlns:p14="http://schemas.microsoft.com/office/powerpoint/2010/main" val="1650793714"/>
       </p:ext>
     </p:extLst>
   </p:cSld>
@@ -2712,14 +3083,14 @@
         </p:nvSpPr>
         <p:spPr>
           <a:xfrm>
-            <a:off x="1" y="758952"/>
-            <a:ext cx="3443590" cy="5330952"/>
+            <a:off x="3175" y="6400800"/>
+            <a:ext cx="12188825" cy="457200"/>
           </a:xfrm>
           <a:prstGeom prst="rect">
             <a:avLst/>
           </a:prstGeom>
           <a:solidFill>
-            <a:schemeClr val="accent1"/>
+            <a:schemeClr val="accent2"/>
           </a:solidFill>
           <a:ln>
             <a:noFill/>
@@ -2744,55 +3115,20 @@
       </p:sp>
       <p:sp>
         <p:nvSpPr>
-          <p:cNvPr id="2" name="Title Placeholder 1"/>
-          <p:cNvSpPr>
-            <a:spLocks noGrp="1"/>
-          </p:cNvSpPr>
-          <p:nvPr>
-            <p:ph type="title"/>
-          </p:nvPr>
-        </p:nvSpPr>
-        <p:spPr>
-          <a:xfrm>
-            <a:off x="252919" y="1123837"/>
-            <a:ext cx="2947482" cy="4601183"/>
-          </a:xfrm>
-          <a:prstGeom prst="rect">
-            <a:avLst/>
-          </a:prstGeom>
-        </p:spPr>
-        <p:txBody>
-          <a:bodyPr vert="horz" lIns="91440" tIns="45720" rIns="91440" bIns="45720" rtlCol="0" anchor="ctr">
-            <a:normAutofit/>
-          </a:bodyPr>
-          <a:lstStyle/>
-          <a:p>
-            <a:r>
-              <a:rPr lang="en-US"/>
-              <a:t>Click to edit Master title style</a:t>
-            </a:r>
-            <a:endParaRPr lang="en-US" dirty="0"/>
-          </a:p>
-        </p:txBody>
-      </p:sp>
-      <p:sp>
-        <p:nvSpPr>
-          <p:cNvPr id="38" name="Rectangle 37"/>
+          <p:cNvPr id="9" name="Rectangle 8"/>
           <p:cNvSpPr/>
           <p:nvPr/>
         </p:nvSpPr>
         <p:spPr>
           <a:xfrm>
-            <a:off x="11815864" y="758952"/>
-            <a:ext cx="384048" cy="5330952"/>
+            <a:off x="15" y="6334316"/>
+            <a:ext cx="12188825" cy="64008"/>
           </a:xfrm>
           <a:prstGeom prst="rect">
             <a:avLst/>
           </a:prstGeom>
           <a:solidFill>
-            <a:srgbClr val="C8C8C8">
-              <a:alpha val="49804"/>
-            </a:srgbClr>
+            <a:schemeClr val="accent1"/>
           </a:solidFill>
           <a:ln>
             <a:noFill/>
@@ -2817,61 +3153,32 @@
       </p:sp>
       <p:sp>
         <p:nvSpPr>
-          <p:cNvPr id="3" name="Text Placeholder 2"/>
-          <p:cNvSpPr>
-            <a:spLocks noGrp="1"/>
-          </p:cNvSpPr>
-          <p:nvPr>
-            <p:ph type="body" idx="1"/>
-          </p:nvPr>
-        </p:nvSpPr>
-        <p:spPr>
-          <a:xfrm>
-            <a:off x="3869268" y="864108"/>
-            <a:ext cx="7315200" cy="5120640"/>
+          <p:cNvPr id="2" name="Title Placeholder 1"/>
+          <p:cNvSpPr>
+            <a:spLocks noGrp="1"/>
+          </p:cNvSpPr>
+          <p:nvPr>
+            <p:ph type="title"/>
+          </p:nvPr>
+        </p:nvSpPr>
+        <p:spPr>
+          <a:xfrm>
+            <a:off x="1097280" y="286603"/>
+            <a:ext cx="10058400" cy="1450757"/>
           </a:xfrm>
           <a:prstGeom prst="rect">
             <a:avLst/>
           </a:prstGeom>
         </p:spPr>
         <p:txBody>
-          <a:bodyPr vert="horz" lIns="91440" tIns="45720" rIns="91440" bIns="45720" rtlCol="0" anchor="ctr">
+          <a:bodyPr vert="horz" lIns="91440" tIns="45720" rIns="91440" bIns="45720" rtlCol="0" anchor="b">
             <a:normAutofit/>
           </a:bodyPr>
           <a:lstStyle/>
           <a:p>
-            <a:pPr lvl="0"/>
-            <a:r>
-              <a:rPr lang="en-US"/>
-              <a:t>Click to edit Master text styles</a:t>
-            </a:r>
-          </a:p>
-          <a:p>
-            <a:pPr lvl="1"/>
-            <a:r>
-              <a:rPr lang="en-US"/>
-              <a:t>Second level</a:t>
-            </a:r>
-          </a:p>
-          <a:p>
-            <a:pPr lvl="2"/>
-            <a:r>
-              <a:rPr lang="en-US"/>
-              <a:t>Third level</a:t>
-            </a:r>
-          </a:p>
-          <a:p>
-            <a:pPr lvl="3"/>
-            <a:r>
-              <a:rPr lang="en-US"/>
-              <a:t>Fourth level</a:t>
-            </a:r>
-          </a:p>
-          <a:p>
-            <a:pPr lvl="4"/>
-            <a:r>
-              <a:rPr lang="en-US"/>
-              <a:t>Fifth level</a:t>
+            <a:r>
+              <a:rPr lang="en-US"/>
+              <a:t>Click to edit Master title style</a:t>
             </a:r>
             <a:endParaRPr lang="en-US" dirty="0"/>
           </a:p>
@@ -2879,33 +3186,92 @@
       </p:sp>
       <p:sp>
         <p:nvSpPr>
-          <p:cNvPr id="4" name="Date Placeholder 3"/>
-          <p:cNvSpPr>
-            <a:spLocks noGrp="1"/>
-          </p:cNvSpPr>
-          <p:nvPr>
-            <p:ph type="dt" sz="half" idx="2"/>
-          </p:nvPr>
-        </p:nvSpPr>
-        <p:spPr>
-          <a:xfrm>
-            <a:off x="262465" y="6356350"/>
-            <a:ext cx="2743200" cy="365125"/>
+          <p:cNvPr id="3" name="Text Placeholder 2"/>
+          <p:cNvSpPr>
+            <a:spLocks noGrp="1"/>
+          </p:cNvSpPr>
+          <p:nvPr>
+            <p:ph type="body" idx="1"/>
+          </p:nvPr>
+        </p:nvSpPr>
+        <p:spPr>
+          <a:xfrm>
+            <a:off x="1097280" y="1845734"/>
+            <a:ext cx="10058400" cy="4023360"/>
           </a:xfrm>
           <a:prstGeom prst="rect">
             <a:avLst/>
           </a:prstGeom>
         </p:spPr>
         <p:txBody>
+          <a:bodyPr vert="horz" lIns="0" tIns="45720" rIns="0" bIns="45720" rtlCol="0">
+            <a:normAutofit/>
+          </a:bodyPr>
+          <a:lstStyle/>
+          <a:p>
+            <a:pPr lvl="0"/>
+            <a:r>
+              <a:rPr lang="en-US"/>
+              <a:t>Click to edit Master text styles</a:t>
+            </a:r>
+          </a:p>
+          <a:p>
+            <a:pPr lvl="1"/>
+            <a:r>
+              <a:rPr lang="en-US"/>
+              <a:t>Second level</a:t>
+            </a:r>
+          </a:p>
+          <a:p>
+            <a:pPr lvl="2"/>
+            <a:r>
+              <a:rPr lang="en-US"/>
+              <a:t>Third level</a:t>
+            </a:r>
+          </a:p>
+          <a:p>
+            <a:pPr lvl="3"/>
+            <a:r>
+              <a:rPr lang="en-US"/>
+              <a:t>Fourth level</a:t>
+            </a:r>
+          </a:p>
+          <a:p>
+            <a:pPr lvl="4"/>
+            <a:r>
+              <a:rPr lang="en-US"/>
+              <a:t>Fifth level</a:t>
+            </a:r>
+            <a:endParaRPr lang="en-US" dirty="0"/>
+          </a:p>
+        </p:txBody>
+      </p:sp>
+      <p:sp>
+        <p:nvSpPr>
+          <p:cNvPr id="4" name="Date Placeholder 3"/>
+          <p:cNvSpPr>
+            <a:spLocks noGrp="1"/>
+          </p:cNvSpPr>
+          <p:nvPr>
+            <p:ph type="dt" sz="half" idx="2"/>
+          </p:nvPr>
+        </p:nvSpPr>
+        <p:spPr>
+          <a:xfrm>
+            <a:off x="1097280" y="6459785"/>
+            <a:ext cx="2472271" cy="365125"/>
+          </a:xfrm>
+          <a:prstGeom prst="rect">
+            <a:avLst/>
+          </a:prstGeom>
+        </p:spPr>
+        <p:txBody>
           <a:bodyPr vert="horz" lIns="91440" tIns="45720" rIns="91440" bIns="45720" rtlCol="0" anchor="ctr"/>
           <a:lstStyle>
             <a:lvl1pPr algn="l">
-              <a:defRPr sz="1100">
+              <a:defRPr sz="900">
                 <a:solidFill>
-                  <a:schemeClr val="tx1">
-                    <a:lumMod val="50000"/>
-                    <a:lumOff val="50000"/>
-                  </a:schemeClr>
+                  <a:srgbClr val="FFFFFF"/>
                 </a:solidFill>
               </a:defRPr>
             </a:lvl1pPr>
@@ -2913,7 +3279,7 @@
           <a:p>
             <a:fld id="{4A1D9E61-7A34-4455-A944-7760DD9E2D94}" type="datetimeFigureOut">
               <a:rPr lang="en-US" smtClean="0"/>
-              <a:t>4/7/2022</a:t>
+              <a:t>4/12/2022</a:t>
             </a:fld>
             <a:endParaRPr lang="en-US"/>
           </a:p>
@@ -2931,8 +3297,8 @@
         </p:nvSpPr>
         <p:spPr>
           <a:xfrm>
-            <a:off x="3869268" y="6356350"/>
-            <a:ext cx="5911517" cy="365125"/>
+            <a:off x="3686185" y="6459785"/>
+            <a:ext cx="4822804" cy="365125"/>
           </a:xfrm>
           <a:prstGeom prst="rect">
             <a:avLst/>
@@ -2941,13 +3307,10 @@
         <p:txBody>
           <a:bodyPr vert="horz" lIns="91440" tIns="45720" rIns="91440" bIns="45720" rtlCol="0" anchor="ctr"/>
           <a:lstStyle>
-            <a:lvl1pPr algn="l">
-              <a:defRPr sz="1100">
+            <a:lvl1pPr algn="ctr">
+              <a:defRPr sz="900" cap="all" baseline="0">
                 <a:solidFill>
-                  <a:schemeClr val="tx1">
-                    <a:lumMod val="50000"/>
-                    <a:lumOff val="50000"/>
-                  </a:schemeClr>
+                  <a:srgbClr val="FFFFFF"/>
                 </a:solidFill>
               </a:defRPr>
             </a:lvl1pPr>
@@ -2969,8 +3332,8 @@
         </p:nvSpPr>
         <p:spPr>
           <a:xfrm>
-            <a:off x="10634135" y="6356350"/>
-            <a:ext cx="1530927" cy="365125"/>
+            <a:off x="9900458" y="6459785"/>
+            <a:ext cx="1312025" cy="365125"/>
           </a:xfrm>
           <a:prstGeom prst="rect">
             <a:avLst/>
@@ -2980,9 +3343,9 @@
           <a:bodyPr vert="horz" lIns="91440" tIns="45720" rIns="91440" bIns="45720" rtlCol="0" anchor="ctr"/>
           <a:lstStyle>
             <a:lvl1pPr algn="r">
-              <a:defRPr sz="1200" b="1">
+              <a:defRPr sz="1050">
                 <a:solidFill>
-                  <a:schemeClr val="accent1"/>
+                  <a:srgbClr val="FFFFFF"/>
                 </a:solidFill>
               </a:defRPr>
             </a:lvl1pPr>
@@ -2996,40 +3359,81 @@
           </a:p>
         </p:txBody>
       </p:sp>
+      <p:cxnSp>
+        <p:nvCxnSpPr>
+          <p:cNvPr id="10" name="Straight Connector 9"/>
+          <p:cNvCxnSpPr/>
+          <p:nvPr/>
+        </p:nvCxnSpPr>
+        <p:spPr>
+          <a:xfrm>
+            <a:off x="1193532" y="1737845"/>
+            <a:ext cx="9966960" cy="0"/>
+          </a:xfrm>
+          <a:prstGeom prst="line">
+            <a:avLst/>
+          </a:prstGeom>
+          <a:ln w="6350">
+            <a:solidFill>
+              <a:schemeClr val="tx1">
+                <a:lumMod val="50000"/>
+                <a:lumOff val="50000"/>
+              </a:schemeClr>
+            </a:solidFill>
+          </a:ln>
+        </p:spPr>
+        <p:style>
+          <a:lnRef idx="1">
+            <a:schemeClr val="accent1"/>
+          </a:lnRef>
+          <a:fillRef idx="0">
+            <a:schemeClr val="accent1"/>
+          </a:fillRef>
+          <a:effectRef idx="0">
+            <a:schemeClr val="accent1"/>
+          </a:effectRef>
+          <a:fontRef idx="minor">
+            <a:schemeClr val="tx1"/>
+          </a:fontRef>
+        </p:style>
+      </p:cxnSp>
     </p:spTree>
     <p:extLst>
       <p:ext uri="{BB962C8B-B14F-4D97-AF65-F5344CB8AC3E}">
-        <p14:creationId xmlns:p14="http://schemas.microsoft.com/office/powerpoint/2010/main" val="3603807437"/>
+        <p14:creationId xmlns:p14="http://schemas.microsoft.com/office/powerpoint/2010/main" val="991030279"/>
       </p:ext>
     </p:extLst>
   </p:cSld>
   <p:clrMap bg1="lt1" tx1="dk1" bg2="lt2" tx2="dk2" accent1="accent1" accent2="accent2" accent3="accent3" accent4="accent4" accent5="accent5" accent6="accent6" hlink="hlink" folHlink="folHlink"/>
   <p:sldLayoutIdLst>
-    <p:sldLayoutId id="2147483661" r:id="rId1"/>
-    <p:sldLayoutId id="2147483662" r:id="rId2"/>
-    <p:sldLayoutId id="2147483663" r:id="rId3"/>
-    <p:sldLayoutId id="2147483664" r:id="rId4"/>
-    <p:sldLayoutId id="2147483665" r:id="rId5"/>
-    <p:sldLayoutId id="2147483666" r:id="rId6"/>
-    <p:sldLayoutId id="2147483667" r:id="rId7"/>
-    <p:sldLayoutId id="2147483668" r:id="rId8"/>
-    <p:sldLayoutId id="2147483669" r:id="rId9"/>
-    <p:sldLayoutId id="2147483670" r:id="rId10"/>
-    <p:sldLayoutId id="2147483671" r:id="rId11"/>
+    <p:sldLayoutId id="2147483720" r:id="rId1"/>
+    <p:sldLayoutId id="2147483721" r:id="rId2"/>
+    <p:sldLayoutId id="2147483722" r:id="rId3"/>
+    <p:sldLayoutId id="2147483723" r:id="rId4"/>
+    <p:sldLayoutId id="2147483724" r:id="rId5"/>
+    <p:sldLayoutId id="2147483725" r:id="rId6"/>
+    <p:sldLayoutId id="2147483726" r:id="rId7"/>
+    <p:sldLayoutId id="2147483727" r:id="rId8"/>
+    <p:sldLayoutId id="2147483728" r:id="rId9"/>
+    <p:sldLayoutId id="2147483729" r:id="rId10"/>
+    <p:sldLayoutId id="2147483730" r:id="rId11"/>
   </p:sldLayoutIdLst>
   <p:txStyles>
     <p:titleStyle>
       <a:lvl1pPr algn="l" defTabSz="914400" rtl="0" eaLnBrk="1" latinLnBrk="0" hangingPunct="1">
         <a:lnSpc>
-          <a:spcPct val="90000"/>
+          <a:spcPct val="85000"/>
         </a:lnSpc>
         <a:spcBef>
           <a:spcPct val="0"/>
         </a:spcBef>
         <a:buNone/>
-        <a:defRPr sz="3600" kern="1200" spc="-60" baseline="0">
+        <a:defRPr sz="4800" kern="1200" spc="-50" baseline="0">
           <a:solidFill>
-            <a:srgbClr val="FFFFFF"/>
+            <a:schemeClr val="tx1">
+              <a:lumMod val="75000"/>
+              <a:lumOff val="25000"/>
+            </a:schemeClr>
           </a:solidFill>
           <a:latin typeface="+mj-lt"/>
           <a:ea typeface="+mj-ea"/>
@@ -3038,23 +3442,27 @@
       </a:lvl1pPr>
     </p:titleStyle>
     <p:bodyStyle>
-      <a:lvl1pPr marL="182880" indent="-182880" algn="l" defTabSz="914400" rtl="0" eaLnBrk="1" latinLnBrk="0" hangingPunct="1">
+      <a:lvl1pPr marL="91440" indent="-91440" algn="l" defTabSz="914400" rtl="0" eaLnBrk="1" latinLnBrk="0" hangingPunct="1">
         <a:lnSpc>
           <a:spcPct val="90000"/>
         </a:lnSpc>
         <a:spcBef>
           <a:spcPts val="1200"/>
         </a:spcBef>
+        <a:spcAft>
+          <a:spcPts val="200"/>
+        </a:spcAft>
         <a:buClr>
           <a:schemeClr val="accent1"/>
         </a:buClr>
-        <a:buFont typeface="Wingdings 2" pitchFamily="18" charset="2"/>
-        <a:buChar char=""/>
+        <a:buSzPct val="100000"/>
+        <a:buFont typeface="Calibri" panose="020F0502020204030204" pitchFamily="34" charset="0"/>
+        <a:buChar char=" "/>
         <a:defRPr sz="2000" kern="1200">
           <a:solidFill>
             <a:schemeClr val="tx1">
-              <a:lumMod val="65000"/>
-              <a:lumOff val="35000"/>
+              <a:lumMod val="75000"/>
+              <a:lumOff val="25000"/>
             </a:schemeClr>
           </a:solidFill>
           <a:latin typeface="+mn-lt"/>
@@ -3062,26 +3470,26 @@
           <a:cs typeface="+mn-cs"/>
         </a:defRPr>
       </a:lvl1pPr>
-      <a:lvl2pPr marL="685800" indent="-182880" algn="l" defTabSz="914400" rtl="0" eaLnBrk="1" latinLnBrk="0" hangingPunct="1">
+      <a:lvl2pPr marL="384048" indent="-182880" algn="l" defTabSz="914400" rtl="0" eaLnBrk="1" latinLnBrk="0" hangingPunct="1">
         <a:lnSpc>
           <a:spcPct val="90000"/>
         </a:lnSpc>
         <a:spcBef>
-          <a:spcPts val="250"/>
+          <a:spcPts val="200"/>
         </a:spcBef>
         <a:spcAft>
-          <a:spcPts val="250"/>
+          <a:spcPts val="400"/>
         </a:spcAft>
         <a:buClr>
           <a:schemeClr val="accent1"/>
         </a:buClr>
-        <a:buFont typeface="Wingdings 2" pitchFamily="18" charset="2"/>
-        <a:buChar char=""/>
+        <a:buFont typeface="Calibri" pitchFamily="34" charset="0"/>
+        <a:buChar char="◦"/>
         <a:defRPr sz="1800" kern="1200">
           <a:solidFill>
             <a:schemeClr val="tx1">
-              <a:lumMod val="65000"/>
-              <a:lumOff val="35000"/>
+              <a:lumMod val="75000"/>
+              <a:lumOff val="25000"/>
             </a:schemeClr>
           </a:solidFill>
           <a:latin typeface="+mn-lt"/>
@@ -3089,26 +3497,26 @@
           <a:cs typeface="+mn-cs"/>
         </a:defRPr>
       </a:lvl2pPr>
-      <a:lvl3pPr marL="1143000" indent="-182880" algn="l" defTabSz="914400" rtl="0" eaLnBrk="1" latinLnBrk="0" hangingPunct="1">
+      <a:lvl3pPr marL="566928" indent="-182880" algn="l" defTabSz="914400" rtl="0" eaLnBrk="1" latinLnBrk="0" hangingPunct="1">
         <a:lnSpc>
           <a:spcPct val="90000"/>
         </a:lnSpc>
         <a:spcBef>
-          <a:spcPts val="250"/>
+          <a:spcPts val="200"/>
         </a:spcBef>
         <a:spcAft>
-          <a:spcPts val="250"/>
+          <a:spcPts val="400"/>
         </a:spcAft>
         <a:buClr>
           <a:schemeClr val="accent1"/>
         </a:buClr>
-        <a:buFont typeface="Wingdings 2" pitchFamily="18" charset="2"/>
-        <a:buChar char=""/>
-        <a:defRPr sz="1600" kern="1200">
+        <a:buFont typeface="Calibri" pitchFamily="34" charset="0"/>
+        <a:buChar char="◦"/>
+        <a:defRPr sz="1400" kern="1200">
           <a:solidFill>
             <a:schemeClr val="tx1">
-              <a:lumMod val="65000"/>
-              <a:lumOff val="35000"/>
+              <a:lumMod val="75000"/>
+              <a:lumOff val="25000"/>
             </a:schemeClr>
           </a:solidFill>
           <a:latin typeface="+mn-lt"/>
@@ -3116,26 +3524,26 @@
           <a:cs typeface="+mn-cs"/>
         </a:defRPr>
       </a:lvl3pPr>
-      <a:lvl4pPr marL="1600200" indent="-182880" algn="l" defTabSz="914400" rtl="0" eaLnBrk="1" latinLnBrk="0" hangingPunct="1">
+      <a:lvl4pPr marL="749808" indent="-182880" algn="l" defTabSz="914400" rtl="0" eaLnBrk="1" latinLnBrk="0" hangingPunct="1">
         <a:lnSpc>
           <a:spcPct val="90000"/>
         </a:lnSpc>
         <a:spcBef>
-          <a:spcPts val="250"/>
+          <a:spcPts val="200"/>
         </a:spcBef>
         <a:spcAft>
-          <a:spcPts val="250"/>
+          <a:spcPts val="400"/>
         </a:spcAft>
         <a:buClr>
           <a:schemeClr val="accent1"/>
         </a:buClr>
-        <a:buFont typeface="Wingdings 2" pitchFamily="18" charset="2"/>
-        <a:buChar char=""/>
+        <a:buFont typeface="Calibri" pitchFamily="34" charset="0"/>
+        <a:buChar char="◦"/>
         <a:defRPr sz="1400" kern="1200">
           <a:solidFill>
             <a:schemeClr val="tx1">
-              <a:lumMod val="65000"/>
-              <a:lumOff val="35000"/>
+              <a:lumMod val="75000"/>
+              <a:lumOff val="25000"/>
             </a:schemeClr>
           </a:solidFill>
           <a:latin typeface="+mn-lt"/>
@@ -3143,26 +3551,26 @@
           <a:cs typeface="+mn-cs"/>
         </a:defRPr>
       </a:lvl4pPr>
-      <a:lvl5pPr marL="2057400" indent="-182880" algn="l" defTabSz="914400" rtl="0" eaLnBrk="1" latinLnBrk="0" hangingPunct="1">
+      <a:lvl5pPr marL="932688" indent="-182880" algn="l" defTabSz="914400" rtl="0" eaLnBrk="1" latinLnBrk="0" hangingPunct="1">
         <a:lnSpc>
           <a:spcPct val="90000"/>
         </a:lnSpc>
         <a:spcBef>
-          <a:spcPts val="250"/>
+          <a:spcPts val="200"/>
         </a:spcBef>
         <a:spcAft>
-          <a:spcPts val="250"/>
+          <a:spcPts val="400"/>
         </a:spcAft>
         <a:buClr>
           <a:schemeClr val="accent1"/>
         </a:buClr>
-        <a:buFont typeface="Wingdings 2" pitchFamily="18" charset="2"/>
-        <a:buChar char=""/>
+        <a:buFont typeface="Calibri" pitchFamily="34" charset="0"/>
+        <a:buChar char="◦"/>
         <a:defRPr sz="1400" kern="1200">
           <a:solidFill>
             <a:schemeClr val="tx1">
-              <a:lumMod val="65000"/>
-              <a:lumOff val="35000"/>
+              <a:lumMod val="75000"/>
+              <a:lumOff val="25000"/>
             </a:schemeClr>
           </a:solidFill>
           <a:latin typeface="+mn-lt"/>
@@ -3170,26 +3578,26 @@
           <a:cs typeface="+mn-cs"/>
         </a:defRPr>
       </a:lvl5pPr>
-      <a:lvl6pPr marL="2514600" indent="-228600" algn="l" defTabSz="914400" rtl="0" eaLnBrk="1" latinLnBrk="0" hangingPunct="1">
+      <a:lvl6pPr marL="1100000" indent="-228600" algn="l" defTabSz="914400" rtl="0" eaLnBrk="1" latinLnBrk="0" hangingPunct="1">
         <a:lnSpc>
           <a:spcPct val="90000"/>
         </a:lnSpc>
         <a:spcBef>
-          <a:spcPts val="250"/>
+          <a:spcPts val="200"/>
         </a:spcBef>
         <a:spcAft>
-          <a:spcPts val="250"/>
+          <a:spcPts val="400"/>
         </a:spcAft>
         <a:buClr>
           <a:schemeClr val="accent1"/>
         </a:buClr>
-        <a:buFont typeface="Wingdings 2" pitchFamily="18" charset="2"/>
-        <a:buChar char=""/>
+        <a:buFont typeface="Calibri" pitchFamily="34" charset="0"/>
+        <a:buChar char="◦"/>
         <a:defRPr sz="1400" kern="1200">
           <a:solidFill>
             <a:schemeClr val="tx1">
-              <a:lumMod val="65000"/>
-              <a:lumOff val="35000"/>
+              <a:lumMod val="75000"/>
+              <a:lumOff val="25000"/>
             </a:schemeClr>
           </a:solidFill>
           <a:latin typeface="+mn-lt"/>
@@ -3197,26 +3605,26 @@
           <a:cs typeface="+mn-cs"/>
         </a:defRPr>
       </a:lvl6pPr>
-      <a:lvl7pPr marL="2971800" indent="-228600" algn="l" defTabSz="914400" rtl="0" eaLnBrk="1" latinLnBrk="0" hangingPunct="1">
+      <a:lvl7pPr marL="1300000" indent="-228600" algn="l" defTabSz="914400" rtl="0" eaLnBrk="1" latinLnBrk="0" hangingPunct="1">
         <a:lnSpc>
           <a:spcPct val="90000"/>
         </a:lnSpc>
         <a:spcBef>
-          <a:spcPts val="250"/>
+          <a:spcPts val="200"/>
         </a:spcBef>
         <a:spcAft>
-          <a:spcPts val="250"/>
+          <a:spcPts val="400"/>
         </a:spcAft>
         <a:buClr>
           <a:schemeClr val="accent1"/>
         </a:buClr>
-        <a:buFont typeface="Wingdings 2" pitchFamily="18" charset="2"/>
-        <a:buChar char=""/>
+        <a:buFont typeface="Calibri" pitchFamily="34" charset="0"/>
+        <a:buChar char="◦"/>
         <a:defRPr sz="1400" kern="1200">
           <a:solidFill>
             <a:schemeClr val="tx1">
-              <a:lumMod val="65000"/>
-              <a:lumOff val="35000"/>
+              <a:lumMod val="75000"/>
+              <a:lumOff val="25000"/>
             </a:schemeClr>
           </a:solidFill>
           <a:latin typeface="+mn-lt"/>
@@ -3224,26 +3632,26 @@
           <a:cs typeface="+mn-cs"/>
         </a:defRPr>
       </a:lvl7pPr>
-      <a:lvl8pPr marL="3429000" indent="-228600" algn="l" defTabSz="914400" rtl="0" eaLnBrk="1" latinLnBrk="0" hangingPunct="1">
+      <a:lvl8pPr marL="1500000" indent="-228600" algn="l" defTabSz="914400" rtl="0" eaLnBrk="1" latinLnBrk="0" hangingPunct="1">
         <a:lnSpc>
           <a:spcPct val="90000"/>
         </a:lnSpc>
         <a:spcBef>
-          <a:spcPts val="250"/>
+          <a:spcPts val="200"/>
         </a:spcBef>
         <a:spcAft>
-          <a:spcPts val="250"/>
+          <a:spcPts val="400"/>
         </a:spcAft>
         <a:buClr>
           <a:schemeClr val="accent1"/>
         </a:buClr>
-        <a:buFont typeface="Wingdings 2" pitchFamily="18" charset="2"/>
-        <a:buChar char=""/>
+        <a:buFont typeface="Calibri" pitchFamily="34" charset="0"/>
+        <a:buChar char="◦"/>
         <a:defRPr sz="1400" kern="1200">
           <a:solidFill>
             <a:schemeClr val="tx1">
-              <a:lumMod val="65000"/>
-              <a:lumOff val="35000"/>
+              <a:lumMod val="75000"/>
+              <a:lumOff val="25000"/>
             </a:schemeClr>
           </a:solidFill>
           <a:latin typeface="+mn-lt"/>
@@ -3251,26 +3659,26 @@
           <a:cs typeface="+mn-cs"/>
         </a:defRPr>
       </a:lvl8pPr>
-      <a:lvl9pPr marL="3886200" indent="-228600" algn="l" defTabSz="914400" rtl="0" eaLnBrk="1" latinLnBrk="0" hangingPunct="1">
+      <a:lvl9pPr marL="1700000" indent="-228600" algn="l" defTabSz="914400" rtl="0" eaLnBrk="1" latinLnBrk="0" hangingPunct="1">
         <a:lnSpc>
           <a:spcPct val="90000"/>
         </a:lnSpc>
         <a:spcBef>
-          <a:spcPts val="250"/>
+          <a:spcPts val="200"/>
         </a:spcBef>
         <a:spcAft>
-          <a:spcPts val="250"/>
+          <a:spcPts val="400"/>
         </a:spcAft>
         <a:buClr>
           <a:schemeClr val="accent1"/>
         </a:buClr>
-        <a:buFont typeface="Wingdings 2" pitchFamily="18" charset="2"/>
-        <a:buChar char=""/>
+        <a:buFont typeface="Calibri" pitchFamily="34" charset="0"/>
+        <a:buChar char="◦"/>
         <a:defRPr sz="1400" kern="1200">
           <a:solidFill>
             <a:schemeClr val="tx1">
-              <a:lumMod val="65000"/>
-              <a:lumOff val="35000"/>
+              <a:lumMod val="75000"/>
+              <a:lumOff val="25000"/>
             </a:schemeClr>
           </a:solidFill>
           <a:latin typeface="+mn-lt"/>
@@ -3411,7 +3819,12 @@
             <p:ph type="ctrTitle"/>
           </p:nvPr>
         </p:nvSpPr>
-        <p:spPr/>
+        <p:spPr>
+          <a:xfrm>
+            <a:off x="1097279" y="574126"/>
+            <a:ext cx="10058400" cy="3566160"/>
+          </a:xfrm>
+        </p:spPr>
         <p:txBody>
           <a:bodyPr/>
           <a:lstStyle/>
@@ -3441,16 +3854,17 @@
         </p:nvSpPr>
         <p:spPr>
           <a:xfrm>
-            <a:off x="9458633" y="1478269"/>
-            <a:ext cx="2733367" cy="3255264"/>
+            <a:off x="3629902" y="4435813"/>
+            <a:ext cx="4932195" cy="1750979"/>
           </a:xfrm>
         </p:spPr>
         <p:txBody>
           <a:bodyPr>
-            <a:normAutofit/>
+            <a:normAutofit fontScale="70000" lnSpcReduction="20000"/>
           </a:bodyPr>
           <a:lstStyle/>
           <a:p>
+            <a:pPr algn="ctr"/>
             <a:r>
               <a:rPr lang="en-US" dirty="0">
                 <a:solidFill>
@@ -3461,6 +3875,7 @@
             </a:r>
           </a:p>
           <a:p>
+            <a:pPr algn="ctr"/>
             <a:r>
               <a:rPr lang="en-US" dirty="0">
                 <a:solidFill>
@@ -3471,6 +3886,7 @@
             </a:r>
           </a:p>
           <a:p>
+            <a:pPr algn="ctr"/>
             <a:r>
               <a:rPr lang="en-US" dirty="0">
                 <a:solidFill>
@@ -3481,6 +3897,7 @@
             </a:r>
           </a:p>
           <a:p>
+            <a:pPr algn="ctr"/>
             <a:r>
               <a:rPr lang="en-US" dirty="0">
                 <a:solidFill>
@@ -3491,6 +3908,7 @@
             </a:r>
           </a:p>
           <a:p>
+            <a:pPr algn="ctr"/>
             <a:r>
               <a:rPr lang="en-US" dirty="0">
                 <a:solidFill>
@@ -3545,78 +3963,365 @@
           <a:chExt cx="0" cy="0"/>
         </a:xfrm>
       </p:grpSpPr>
-      <p:sp>
-        <p:nvSpPr>
-          <p:cNvPr id="2" name="Title 1">
+      <p:pic>
+        <p:nvPicPr>
+          <p:cNvPr id="10" name="Content Placeholder 9" descr="Graphical user interface, application&#10;&#10;Description automatically generated">
             <a:extLst>
               <a:ext uri="{FF2B5EF4-FFF2-40B4-BE49-F238E27FC236}">
-                <a16:creationId xmlns:a16="http://schemas.microsoft.com/office/drawing/2014/main" id="{D7550B6D-AF54-4EAA-B0A0-C08D9EB4A5A9}"/>
+                <a16:creationId xmlns:a16="http://schemas.microsoft.com/office/drawing/2014/main" id="{0EB68185-87B1-438F-8B2A-59C3BDF47218}"/>
               </a:ext>
             </a:extLst>
           </p:cNvPr>
-          <p:cNvSpPr>
-            <a:spLocks noGrp="1"/>
-          </p:cNvSpPr>
-          <p:nvPr>
-            <p:ph type="title"/>
-          </p:nvPr>
-        </p:nvSpPr>
-        <p:spPr/>
-        <p:txBody>
-          <a:bodyPr/>
-          <a:lstStyle/>
-          <a:p>
-            <a:endParaRPr lang="en-US" dirty="0"/>
-          </a:p>
-        </p:txBody>
-      </p:sp>
-      <p:sp>
-        <p:nvSpPr>
-          <p:cNvPr id="3" name="Content Placeholder 2">
+          <p:cNvPicPr>
+            <a:picLocks noGrp="1" noChangeAspect="1"/>
+          </p:cNvPicPr>
+          <p:nvPr>
+            <p:ph sz="half" idx="1"/>
+          </p:nvPr>
+        </p:nvPicPr>
+        <p:blipFill>
+          <a:blip r:embed="rId2">
+            <a:extLst>
+              <a:ext uri="{28A0092B-C50C-407E-A947-70E740481C1C}">
+                <a14:useLocalDpi xmlns:a14="http://schemas.microsoft.com/office/drawing/2010/main" val="0"/>
+              </a:ext>
+            </a:extLst>
+          </a:blip>
+          <a:stretch>
+            <a:fillRect/>
+          </a:stretch>
+        </p:blipFill>
+        <p:spPr>
+          <a:xfrm>
+            <a:off x="500363" y="812927"/>
+            <a:ext cx="1915953" cy="5232147"/>
+          </a:xfrm>
+        </p:spPr>
+      </p:pic>
+      <p:pic>
+        <p:nvPicPr>
+          <p:cNvPr id="12" name="Content Placeholder 11" descr="Graphical user interface, text, application&#10;&#10;Description automatically generated">
             <a:extLst>
               <a:ext uri="{FF2B5EF4-FFF2-40B4-BE49-F238E27FC236}">
-                <a16:creationId xmlns:a16="http://schemas.microsoft.com/office/drawing/2014/main" id="{C744107B-3D20-45E0-AA1D-A8554F50E764}"/>
+                <a16:creationId xmlns:a16="http://schemas.microsoft.com/office/drawing/2014/main" id="{C7C7FAEE-453F-4754-9D41-1BC9B7BED261}"/>
               </a:ext>
             </a:extLst>
           </p:cNvPr>
-          <p:cNvSpPr>
-            <a:spLocks noGrp="1"/>
-          </p:cNvSpPr>
-          <p:nvPr>
-            <p:ph sz="half" idx="1"/>
-          </p:nvPr>
-        </p:nvSpPr>
-        <p:spPr/>
-        <p:txBody>
-          <a:bodyPr/>
-          <a:lstStyle/>
-          <a:p>
-            <a:endParaRPr lang="en-US" dirty="0"/>
-          </a:p>
-        </p:txBody>
-      </p:sp>
-      <p:sp>
-        <p:nvSpPr>
-          <p:cNvPr id="4" name="Content Placeholder 3">
+          <p:cNvPicPr>
+            <a:picLocks noGrp="1" noChangeAspect="1"/>
+          </p:cNvPicPr>
+          <p:nvPr>
+            <p:ph sz="half" idx="2"/>
+          </p:nvPr>
+        </p:nvPicPr>
+        <p:blipFill>
+          <a:blip r:embed="rId3">
+            <a:extLst>
+              <a:ext uri="{28A0092B-C50C-407E-A947-70E740481C1C}">
+                <a14:useLocalDpi xmlns:a14="http://schemas.microsoft.com/office/drawing/2010/main" val="0"/>
+              </a:ext>
+            </a:extLst>
+          </a:blip>
+          <a:stretch>
+            <a:fillRect/>
+          </a:stretch>
+        </p:blipFill>
+        <p:spPr>
+          <a:xfrm>
+            <a:off x="4010009" y="792163"/>
+            <a:ext cx="1668935" cy="5232147"/>
+          </a:xfrm>
+        </p:spPr>
+      </p:pic>
+      <p:sp>
+        <p:nvSpPr>
+          <p:cNvPr id="5" name="TextBox 4">
             <a:extLst>
               <a:ext uri="{FF2B5EF4-FFF2-40B4-BE49-F238E27FC236}">
-                <a16:creationId xmlns:a16="http://schemas.microsoft.com/office/drawing/2014/main" id="{085C5D42-DD97-488E-BB51-0111630D2618}"/>
+                <a16:creationId xmlns:a16="http://schemas.microsoft.com/office/drawing/2014/main" id="{CB08175E-E2B2-4E14-B9F6-A76069B78E9B}"/>
               </a:ext>
             </a:extLst>
           </p:cNvPr>
-          <p:cNvSpPr>
-            <a:spLocks noGrp="1"/>
-          </p:cNvSpPr>
-          <p:nvPr>
-            <p:ph sz="half" idx="2"/>
-          </p:nvPr>
-        </p:nvSpPr>
-        <p:spPr/>
-        <p:txBody>
-          <a:bodyPr/>
-          <a:lstStyle/>
-          <a:p>
+          <p:cNvSpPr txBox="1"/>
+          <p:nvPr/>
+        </p:nvSpPr>
+        <p:spPr>
+          <a:xfrm>
+            <a:off x="500363" y="165370"/>
+            <a:ext cx="8706255" cy="461665"/>
+          </a:xfrm>
+          <a:prstGeom prst="rect">
+            <a:avLst/>
+          </a:prstGeom>
+          <a:noFill/>
+        </p:spPr>
+        <p:txBody>
+          <a:bodyPr wrap="square" rtlCol="0">
+            <a:spAutoFit/>
+          </a:bodyPr>
+          <a:lstStyle/>
+          <a:p>
+            <a:r>
+              <a:rPr lang="en-US" sz="2400" dirty="0"/>
+              <a:t>Color Design Choices</a:t>
+            </a:r>
+          </a:p>
+        </p:txBody>
+      </p:sp>
+      <p:sp>
+        <p:nvSpPr>
+          <p:cNvPr id="8" name="Arrow: Right 7">
+            <a:extLst>
+              <a:ext uri="{FF2B5EF4-FFF2-40B4-BE49-F238E27FC236}">
+                <a16:creationId xmlns:a16="http://schemas.microsoft.com/office/drawing/2014/main" id="{0D66B201-DBE7-4C53-A7E7-CB18B174B0E3}"/>
+              </a:ext>
+            </a:extLst>
+          </p:cNvPr>
+          <p:cNvSpPr/>
+          <p:nvPr/>
+        </p:nvSpPr>
+        <p:spPr>
+          <a:xfrm>
+            <a:off x="2416316" y="3176080"/>
+            <a:ext cx="1593693" cy="505839"/>
+          </a:xfrm>
+          <a:prstGeom prst="rightArrow">
+            <a:avLst/>
+          </a:prstGeom>
+        </p:spPr>
+        <p:style>
+          <a:lnRef idx="2">
+            <a:schemeClr val="dk1">
+              <a:shade val="50000"/>
+            </a:schemeClr>
+          </a:lnRef>
+          <a:fillRef idx="1">
+            <a:schemeClr val="dk1"/>
+          </a:fillRef>
+          <a:effectRef idx="0">
+            <a:schemeClr val="dk1"/>
+          </a:effectRef>
+          <a:fontRef idx="minor">
+            <a:schemeClr val="lt1"/>
+          </a:fontRef>
+        </p:style>
+        <p:txBody>
+          <a:bodyPr rtlCol="0" anchor="ctr"/>
+          <a:lstStyle/>
+          <a:p>
+            <a:pPr algn="ctr"/>
             <a:endParaRPr lang="en-US"/>
+          </a:p>
+        </p:txBody>
+      </p:sp>
+      <p:sp>
+        <p:nvSpPr>
+          <p:cNvPr id="13" name="TextBox 12">
+            <a:extLst>
+              <a:ext uri="{FF2B5EF4-FFF2-40B4-BE49-F238E27FC236}">
+                <a16:creationId xmlns:a16="http://schemas.microsoft.com/office/drawing/2014/main" id="{0C4C8BE3-021E-48AA-A595-ACB939639830}"/>
+              </a:ext>
+            </a:extLst>
+          </p:cNvPr>
+          <p:cNvSpPr txBox="1"/>
+          <p:nvPr/>
+        </p:nvSpPr>
+        <p:spPr>
+          <a:xfrm>
+            <a:off x="6513058" y="771140"/>
+            <a:ext cx="2693560" cy="369332"/>
+          </a:xfrm>
+          <a:prstGeom prst="rect">
+            <a:avLst/>
+          </a:prstGeom>
+          <a:noFill/>
+        </p:spPr>
+        <p:txBody>
+          <a:bodyPr wrap="square" rtlCol="0">
+            <a:spAutoFit/>
+          </a:bodyPr>
+          <a:lstStyle/>
+          <a:p>
+            <a:r>
+              <a:rPr lang="en-US" dirty="0"/>
+              <a:t>Old versions problems ?</a:t>
+            </a:r>
+          </a:p>
+        </p:txBody>
+      </p:sp>
+      <p:sp>
+        <p:nvSpPr>
+          <p:cNvPr id="14" name="TextBox 13">
+            <a:extLst>
+              <a:ext uri="{FF2B5EF4-FFF2-40B4-BE49-F238E27FC236}">
+                <a16:creationId xmlns:a16="http://schemas.microsoft.com/office/drawing/2014/main" id="{47DC1F27-D6D1-4DE1-849B-A817EDEDE827}"/>
+              </a:ext>
+            </a:extLst>
+          </p:cNvPr>
+          <p:cNvSpPr txBox="1"/>
+          <p:nvPr/>
+        </p:nvSpPr>
+        <p:spPr>
+          <a:xfrm>
+            <a:off x="6513058" y="1343909"/>
+            <a:ext cx="3735318" cy="1754326"/>
+          </a:xfrm>
+          <a:prstGeom prst="rect">
+            <a:avLst/>
+          </a:prstGeom>
+          <a:noFill/>
+        </p:spPr>
+        <p:txBody>
+          <a:bodyPr wrap="none" rtlCol="0">
+            <a:spAutoFit/>
+          </a:bodyPr>
+          <a:lstStyle/>
+          <a:p>
+            <a:pPr marL="285750" indent="-285750">
+              <a:buFont typeface="Arial" panose="020B0604020202020204" pitchFamily="34" charset="0"/>
+              <a:buChar char="•"/>
+            </a:pPr>
+            <a:r>
+              <a:rPr lang="en-US" dirty="0"/>
+              <a:t>Background color too noisy</a:t>
+            </a:r>
+          </a:p>
+          <a:p>
+            <a:pPr marL="285750" indent="-285750">
+              <a:buFont typeface="Arial" panose="020B0604020202020204" pitchFamily="34" charset="0"/>
+              <a:buChar char="•"/>
+            </a:pPr>
+            <a:endParaRPr lang="en-US" dirty="0"/>
+          </a:p>
+          <a:p>
+            <a:pPr marL="285750" indent="-285750">
+              <a:buFont typeface="Arial" panose="020B0604020202020204" pitchFamily="34" charset="0"/>
+              <a:buChar char="•"/>
+            </a:pPr>
+            <a:r>
+              <a:rPr lang="en-US" dirty="0"/>
+              <a:t>Noisy colors reduce readability </a:t>
+            </a:r>
+          </a:p>
+          <a:p>
+            <a:r>
+              <a:rPr lang="en-US" dirty="0"/>
+              <a:t>Scanning speed </a:t>
+            </a:r>
+          </a:p>
+          <a:p>
+            <a:endParaRPr lang="en-US" dirty="0"/>
+          </a:p>
+          <a:p>
+            <a:pPr marL="285750" indent="-285750">
+              <a:buFont typeface="Arial" panose="020B0604020202020204" pitchFamily="34" charset="0"/>
+              <a:buChar char="•"/>
+            </a:pPr>
+            <a:r>
+              <a:rPr lang="en-US" dirty="0"/>
+              <a:t>Looks unprofessional </a:t>
+            </a:r>
+          </a:p>
+        </p:txBody>
+      </p:sp>
+      <p:sp>
+        <p:nvSpPr>
+          <p:cNvPr id="15" name="TextBox 14">
+            <a:extLst>
+              <a:ext uri="{FF2B5EF4-FFF2-40B4-BE49-F238E27FC236}">
+                <a16:creationId xmlns:a16="http://schemas.microsoft.com/office/drawing/2014/main" id="{10557562-8CC2-4674-9B5A-FA049744B77C}"/>
+              </a:ext>
+            </a:extLst>
+          </p:cNvPr>
+          <p:cNvSpPr txBox="1"/>
+          <p:nvPr/>
+        </p:nvSpPr>
+        <p:spPr>
+          <a:xfrm>
+            <a:off x="6513056" y="3113435"/>
+            <a:ext cx="3569213" cy="646331"/>
+          </a:xfrm>
+          <a:prstGeom prst="rect">
+            <a:avLst/>
+          </a:prstGeom>
+          <a:noFill/>
+        </p:spPr>
+        <p:txBody>
+          <a:bodyPr wrap="square" rtlCol="0">
+            <a:spAutoFit/>
+          </a:bodyPr>
+          <a:lstStyle/>
+          <a:p>
+            <a:r>
+              <a:rPr lang="en-US" dirty="0"/>
+              <a:t>How does the new version fix those problems ?</a:t>
+            </a:r>
+          </a:p>
+        </p:txBody>
+      </p:sp>
+      <p:sp>
+        <p:nvSpPr>
+          <p:cNvPr id="16" name="TextBox 15">
+            <a:extLst>
+              <a:ext uri="{FF2B5EF4-FFF2-40B4-BE49-F238E27FC236}">
+                <a16:creationId xmlns:a16="http://schemas.microsoft.com/office/drawing/2014/main" id="{C7846874-891B-41E1-95ED-FF357CCDB968}"/>
+              </a:ext>
+            </a:extLst>
+          </p:cNvPr>
+          <p:cNvSpPr txBox="1"/>
+          <p:nvPr/>
+        </p:nvSpPr>
+        <p:spPr>
+          <a:xfrm>
+            <a:off x="6503217" y="3917036"/>
+            <a:ext cx="3569213" cy="2308324"/>
+          </a:xfrm>
+          <a:prstGeom prst="rect">
+            <a:avLst/>
+          </a:prstGeom>
+          <a:noFill/>
+        </p:spPr>
+        <p:txBody>
+          <a:bodyPr wrap="square" rtlCol="0">
+            <a:spAutoFit/>
+          </a:bodyPr>
+          <a:lstStyle/>
+          <a:p>
+            <a:pPr marL="285750" indent="-285750">
+              <a:buFont typeface="Arial" panose="020B0604020202020204" pitchFamily="34" charset="0"/>
+              <a:buChar char="•"/>
+            </a:pPr>
+            <a:r>
+              <a:rPr lang="en-US" dirty="0"/>
+              <a:t>Better color pallet using monochromatic scheme on the top bar and buttons</a:t>
+            </a:r>
+          </a:p>
+          <a:p>
+            <a:pPr marL="285750" indent="-285750">
+              <a:buFont typeface="Arial" panose="020B0604020202020204" pitchFamily="34" charset="0"/>
+              <a:buChar char="•"/>
+            </a:pPr>
+            <a:endParaRPr lang="en-US" dirty="0"/>
+          </a:p>
+          <a:p>
+            <a:pPr marL="285750" indent="-285750">
+              <a:buFont typeface="Arial" panose="020B0604020202020204" pitchFamily="34" charset="0"/>
+              <a:buChar char="•"/>
+            </a:pPr>
+            <a:r>
+              <a:rPr lang="en-US" dirty="0"/>
+              <a:t>Less noise by using a white background which improves readability </a:t>
+            </a:r>
+          </a:p>
+          <a:p>
+            <a:pPr marL="285750" indent="-285750">
+              <a:buFont typeface="Arial" panose="020B0604020202020204" pitchFamily="34" charset="0"/>
+              <a:buChar char="•"/>
+            </a:pPr>
+            <a:r>
+              <a:rPr lang="en-US" dirty="0"/>
+              <a:t>Looks professional and clean</a:t>
+            </a:r>
           </a:p>
         </p:txBody>
       </p:sp>
@@ -3630,6 +4335,366 @@
   <p:clrMapOvr>
     <a:masterClrMapping/>
   </p:clrMapOvr>
+  <mc:AlternateContent xmlns:mc="http://schemas.openxmlformats.org/markup-compatibility/2006">
+    <mc:Choice xmlns:p14="http://schemas.microsoft.com/office/powerpoint/2010/main" Requires="p14">
+      <p:transition p14:dur="10"/>
+    </mc:Choice>
+    <mc:Fallback>
+      <p:transition/>
+    </mc:Fallback>
+  </mc:AlternateContent>
+  <p:timing>
+    <p:tnLst>
+      <p:par>
+        <p:cTn id="1" dur="indefinite" restart="never" nodeType="tmRoot">
+          <p:childTnLst>
+            <p:seq concurrent="1" nextAc="seek">
+              <p:cTn id="2" dur="indefinite" nodeType="mainSeq">
+                <p:childTnLst>
+                  <p:par>
+                    <p:cTn id="3" fill="hold">
+                      <p:stCondLst>
+                        <p:cond delay="indefinite"/>
+                      </p:stCondLst>
+                      <p:childTnLst>
+                        <p:par>
+                          <p:cTn id="4" fill="hold">
+                            <p:stCondLst>
+                              <p:cond delay="0"/>
+                            </p:stCondLst>
+                            <p:childTnLst>
+                              <p:par>
+                                <p:cTn id="5" presetID="1" presetClass="entr" presetSubtype="0" fill="hold" nodeType="clickEffect">
+                                  <p:stCondLst>
+                                    <p:cond delay="0"/>
+                                  </p:stCondLst>
+                                  <p:childTnLst>
+                                    <p:set>
+                                      <p:cBhvr>
+                                        <p:cTn id="6" dur="1" fill="hold">
+                                          <p:stCondLst>
+                                            <p:cond delay="0"/>
+                                          </p:stCondLst>
+                                        </p:cTn>
+                                        <p:tgtEl>
+                                          <p:spTgt spid="10"/>
+                                        </p:tgtEl>
+                                        <p:attrNameLst>
+                                          <p:attrName>style.visibility</p:attrName>
+                                        </p:attrNameLst>
+                                      </p:cBhvr>
+                                      <p:to>
+                                        <p:strVal val="visible"/>
+                                      </p:to>
+                                    </p:set>
+                                  </p:childTnLst>
+                                </p:cTn>
+                              </p:par>
+                            </p:childTnLst>
+                          </p:cTn>
+                        </p:par>
+                      </p:childTnLst>
+                    </p:cTn>
+                  </p:par>
+                  <p:par>
+                    <p:cTn id="7" fill="hold">
+                      <p:stCondLst>
+                        <p:cond delay="indefinite"/>
+                      </p:stCondLst>
+                      <p:childTnLst>
+                        <p:par>
+                          <p:cTn id="8" fill="hold">
+                            <p:stCondLst>
+                              <p:cond delay="0"/>
+                            </p:stCondLst>
+                            <p:childTnLst>
+                              <p:par>
+                                <p:cTn id="9" presetID="1" presetClass="entr" presetSubtype="0" fill="hold" grpId="0" nodeType="clickEffect">
+                                  <p:stCondLst>
+                                    <p:cond delay="0"/>
+                                  </p:stCondLst>
+                                  <p:childTnLst>
+                                    <p:set>
+                                      <p:cBhvr>
+                                        <p:cTn id="10" dur="1" fill="hold">
+                                          <p:stCondLst>
+                                            <p:cond delay="0"/>
+                                          </p:stCondLst>
+                                        </p:cTn>
+                                        <p:tgtEl>
+                                          <p:spTgt spid="13"/>
+                                        </p:tgtEl>
+                                        <p:attrNameLst>
+                                          <p:attrName>style.visibility</p:attrName>
+                                        </p:attrNameLst>
+                                      </p:cBhvr>
+                                      <p:to>
+                                        <p:strVal val="visible"/>
+                                      </p:to>
+                                    </p:set>
+                                  </p:childTnLst>
+                                </p:cTn>
+                              </p:par>
+                            </p:childTnLst>
+                          </p:cTn>
+                        </p:par>
+                      </p:childTnLst>
+                    </p:cTn>
+                  </p:par>
+                  <p:par>
+                    <p:cTn id="11" fill="hold">
+                      <p:stCondLst>
+                        <p:cond delay="indefinite"/>
+                      </p:stCondLst>
+                      <p:childTnLst>
+                        <p:par>
+                          <p:cTn id="12" fill="hold">
+                            <p:stCondLst>
+                              <p:cond delay="0"/>
+                            </p:stCondLst>
+                            <p:childTnLst>
+                              <p:par>
+                                <p:cTn id="13" presetID="1" presetClass="entr" presetSubtype="0" fill="hold" grpId="0" nodeType="clickEffect">
+                                  <p:stCondLst>
+                                    <p:cond delay="0"/>
+                                  </p:stCondLst>
+                                  <p:childTnLst>
+                                    <p:set>
+                                      <p:cBhvr>
+                                        <p:cTn id="14" dur="1" fill="hold">
+                                          <p:stCondLst>
+                                            <p:cond delay="0"/>
+                                          </p:stCondLst>
+                                        </p:cTn>
+                                        <p:tgtEl>
+                                          <p:spTgt spid="14"/>
+                                        </p:tgtEl>
+                                        <p:attrNameLst>
+                                          <p:attrName>style.visibility</p:attrName>
+                                        </p:attrNameLst>
+                                      </p:cBhvr>
+                                      <p:to>
+                                        <p:strVal val="visible"/>
+                                      </p:to>
+                                    </p:set>
+                                  </p:childTnLst>
+                                </p:cTn>
+                              </p:par>
+                            </p:childTnLst>
+                          </p:cTn>
+                        </p:par>
+                      </p:childTnLst>
+                    </p:cTn>
+                  </p:par>
+                  <p:par>
+                    <p:cTn id="15" fill="hold">
+                      <p:stCondLst>
+                        <p:cond delay="indefinite"/>
+                      </p:stCondLst>
+                      <p:childTnLst>
+                        <p:par>
+                          <p:cTn id="16" fill="hold">
+                            <p:stCondLst>
+                              <p:cond delay="0"/>
+                            </p:stCondLst>
+                            <p:childTnLst>
+                              <p:par>
+                                <p:cTn id="17" presetID="1" presetClass="entr" presetSubtype="0" fill="hold" grpId="0" nodeType="clickEffect">
+                                  <p:stCondLst>
+                                    <p:cond delay="0"/>
+                                  </p:stCondLst>
+                                  <p:childTnLst>
+                                    <p:set>
+                                      <p:cBhvr>
+                                        <p:cTn id="18" dur="1" fill="hold">
+                                          <p:stCondLst>
+                                            <p:cond delay="0"/>
+                                          </p:stCondLst>
+                                        </p:cTn>
+                                        <p:tgtEl>
+                                          <p:spTgt spid="8"/>
+                                        </p:tgtEl>
+                                        <p:attrNameLst>
+                                          <p:attrName>style.visibility</p:attrName>
+                                        </p:attrNameLst>
+                                      </p:cBhvr>
+                                      <p:to>
+                                        <p:strVal val="visible"/>
+                                      </p:to>
+                                    </p:set>
+                                  </p:childTnLst>
+                                </p:cTn>
+                              </p:par>
+                            </p:childTnLst>
+                          </p:cTn>
+                        </p:par>
+                      </p:childTnLst>
+                    </p:cTn>
+                  </p:par>
+                  <p:par>
+                    <p:cTn id="19" fill="hold">
+                      <p:stCondLst>
+                        <p:cond delay="indefinite"/>
+                      </p:stCondLst>
+                      <p:childTnLst>
+                        <p:par>
+                          <p:cTn id="20" fill="hold">
+                            <p:stCondLst>
+                              <p:cond delay="0"/>
+                            </p:stCondLst>
+                            <p:childTnLst>
+                              <p:par>
+                                <p:cTn id="21" presetID="1" presetClass="entr" presetSubtype="0" fill="hold" nodeType="clickEffect">
+                                  <p:stCondLst>
+                                    <p:cond delay="0"/>
+                                  </p:stCondLst>
+                                  <p:childTnLst>
+                                    <p:set>
+                                      <p:cBhvr>
+                                        <p:cTn id="22" dur="1" fill="hold">
+                                          <p:stCondLst>
+                                            <p:cond delay="0"/>
+                                          </p:stCondLst>
+                                        </p:cTn>
+                                        <p:tgtEl>
+                                          <p:spTgt spid="12"/>
+                                        </p:tgtEl>
+                                        <p:attrNameLst>
+                                          <p:attrName>style.visibility</p:attrName>
+                                        </p:attrNameLst>
+                                      </p:cBhvr>
+                                      <p:to>
+                                        <p:strVal val="visible"/>
+                                      </p:to>
+                                    </p:set>
+                                  </p:childTnLst>
+                                </p:cTn>
+                              </p:par>
+                            </p:childTnLst>
+                          </p:cTn>
+                        </p:par>
+                      </p:childTnLst>
+                    </p:cTn>
+                  </p:par>
+                  <p:par>
+                    <p:cTn id="23" fill="hold">
+                      <p:stCondLst>
+                        <p:cond delay="indefinite"/>
+                      </p:stCondLst>
+                      <p:childTnLst>
+                        <p:par>
+                          <p:cTn id="24" fill="hold">
+                            <p:stCondLst>
+                              <p:cond delay="0"/>
+                            </p:stCondLst>
+                            <p:childTnLst>
+                              <p:par>
+                                <p:cTn id="25" presetID="1" presetClass="entr" presetSubtype="0" fill="hold" grpId="0" nodeType="clickEffect">
+                                  <p:stCondLst>
+                                    <p:cond delay="0"/>
+                                  </p:stCondLst>
+                                  <p:childTnLst>
+                                    <p:set>
+                                      <p:cBhvr>
+                                        <p:cTn id="26" dur="1" fill="hold">
+                                          <p:stCondLst>
+                                            <p:cond delay="0"/>
+                                          </p:stCondLst>
+                                        </p:cTn>
+                                        <p:tgtEl>
+                                          <p:spTgt spid="15"/>
+                                        </p:tgtEl>
+                                        <p:attrNameLst>
+                                          <p:attrName>style.visibility</p:attrName>
+                                        </p:attrNameLst>
+                                      </p:cBhvr>
+                                      <p:to>
+                                        <p:strVal val="visible"/>
+                                      </p:to>
+                                    </p:set>
+                                  </p:childTnLst>
+                                </p:cTn>
+                              </p:par>
+                            </p:childTnLst>
+                          </p:cTn>
+                        </p:par>
+                      </p:childTnLst>
+                    </p:cTn>
+                  </p:par>
+                  <p:par>
+                    <p:cTn id="27" fill="hold">
+                      <p:stCondLst>
+                        <p:cond delay="indefinite"/>
+                      </p:stCondLst>
+                      <p:childTnLst>
+                        <p:par>
+                          <p:cTn id="28" fill="hold">
+                            <p:stCondLst>
+                              <p:cond delay="0"/>
+                            </p:stCondLst>
+                            <p:childTnLst>
+                              <p:par>
+                                <p:cTn id="29" presetID="1" presetClass="entr" presetSubtype="0" fill="hold" grpId="0" nodeType="clickEffect">
+                                  <p:stCondLst>
+                                    <p:cond delay="0"/>
+                                  </p:stCondLst>
+                                  <p:childTnLst>
+                                    <p:set>
+                                      <p:cBhvr>
+                                        <p:cTn id="30" dur="1" fill="hold">
+                                          <p:stCondLst>
+                                            <p:cond delay="0"/>
+                                          </p:stCondLst>
+                                        </p:cTn>
+                                        <p:tgtEl>
+                                          <p:spTgt spid="16"/>
+                                        </p:tgtEl>
+                                        <p:attrNameLst>
+                                          <p:attrName>style.visibility</p:attrName>
+                                        </p:attrNameLst>
+                                      </p:cBhvr>
+                                      <p:to>
+                                        <p:strVal val="visible"/>
+                                      </p:to>
+                                    </p:set>
+                                  </p:childTnLst>
+                                </p:cTn>
+                              </p:par>
+                            </p:childTnLst>
+                          </p:cTn>
+                        </p:par>
+                      </p:childTnLst>
+                    </p:cTn>
+                  </p:par>
+                </p:childTnLst>
+              </p:cTn>
+              <p:prevCondLst>
+                <p:cond evt="onPrev" delay="0">
+                  <p:tgtEl>
+                    <p:sldTgt/>
+                  </p:tgtEl>
+                </p:cond>
+              </p:prevCondLst>
+              <p:nextCondLst>
+                <p:cond evt="onNext" delay="0">
+                  <p:tgtEl>
+                    <p:sldTgt/>
+                  </p:tgtEl>
+                </p:cond>
+              </p:nextCondLst>
+            </p:seq>
+          </p:childTnLst>
+        </p:cTn>
+      </p:par>
+    </p:tnLst>
+    <p:bldLst>
+      <p:bldP spid="8" grpId="0" animBg="1"/>
+      <p:bldP spid="13" grpId="0"/>
+      <p:bldP spid="14" grpId="0"/>
+      <p:bldP spid="15" grpId="0"/>
+      <p:bldP spid="16" grpId="0"/>
+    </p:bldLst>
+  </p:timing>
 </p:sld>
 </file>
 
@@ -3725,10 +4790,45 @@
           </a:p>
         </p:txBody>
       </p:sp>
+      <p:sp>
+        <p:nvSpPr>
+          <p:cNvPr id="5" name="TextBox 4">
+            <a:extLst>
+              <a:ext uri="{FF2B5EF4-FFF2-40B4-BE49-F238E27FC236}">
+                <a16:creationId xmlns:a16="http://schemas.microsoft.com/office/drawing/2014/main" id="{CB08175E-E2B2-4E14-B9F6-A76069B78E9B}"/>
+              </a:ext>
+            </a:extLst>
+          </p:cNvPr>
+          <p:cNvSpPr txBox="1"/>
+          <p:nvPr/>
+        </p:nvSpPr>
+        <p:spPr>
+          <a:xfrm>
+            <a:off x="252919" y="252919"/>
+            <a:ext cx="8706255" cy="369332"/>
+          </a:xfrm>
+          <a:prstGeom prst="rect">
+            <a:avLst/>
+          </a:prstGeom>
+          <a:noFill/>
+        </p:spPr>
+        <p:txBody>
+          <a:bodyPr wrap="square" rtlCol="0">
+            <a:spAutoFit/>
+          </a:bodyPr>
+          <a:lstStyle/>
+          <a:p>
+            <a:r>
+              <a:rPr lang="en-US" dirty="0"/>
+              <a:t>Font Design  Choices</a:t>
+            </a:r>
+          </a:p>
+        </p:txBody>
+      </p:sp>
     </p:spTree>
     <p:extLst>
       <p:ext uri="{BB962C8B-B14F-4D97-AF65-F5344CB8AC3E}">
-        <p14:creationId xmlns:p14="http://schemas.microsoft.com/office/powerpoint/2010/main" val="1850392545"/>
+        <p14:creationId xmlns:p14="http://schemas.microsoft.com/office/powerpoint/2010/main" val="761519441"/>
       </p:ext>
     </p:extLst>
   </p:cSld>
@@ -3830,10 +4930,45 @@
           </a:p>
         </p:txBody>
       </p:sp>
+      <p:sp>
+        <p:nvSpPr>
+          <p:cNvPr id="5" name="TextBox 4">
+            <a:extLst>
+              <a:ext uri="{FF2B5EF4-FFF2-40B4-BE49-F238E27FC236}">
+                <a16:creationId xmlns:a16="http://schemas.microsoft.com/office/drawing/2014/main" id="{CB08175E-E2B2-4E14-B9F6-A76069B78E9B}"/>
+              </a:ext>
+            </a:extLst>
+          </p:cNvPr>
+          <p:cNvSpPr txBox="1"/>
+          <p:nvPr/>
+        </p:nvSpPr>
+        <p:spPr>
+          <a:xfrm>
+            <a:off x="252919" y="252919"/>
+            <a:ext cx="8706255" cy="369332"/>
+          </a:xfrm>
+          <a:prstGeom prst="rect">
+            <a:avLst/>
+          </a:prstGeom>
+          <a:noFill/>
+        </p:spPr>
+        <p:txBody>
+          <a:bodyPr wrap="square" rtlCol="0">
+            <a:spAutoFit/>
+          </a:bodyPr>
+          <a:lstStyle/>
+          <a:p>
+            <a:r>
+              <a:rPr lang="en-US" dirty="0"/>
+              <a:t>Button Design Choices</a:t>
+            </a:r>
+          </a:p>
+        </p:txBody>
+      </p:sp>
     </p:spTree>
     <p:extLst>
       <p:ext uri="{BB962C8B-B14F-4D97-AF65-F5344CB8AC3E}">
-        <p14:creationId xmlns:p14="http://schemas.microsoft.com/office/powerpoint/2010/main" val="458438940"/>
+        <p14:creationId xmlns:p14="http://schemas.microsoft.com/office/powerpoint/2010/main" val="49572778"/>
       </p:ext>
     </p:extLst>
   </p:cSld>
@@ -3844,58 +4979,93 @@
 </file>
 
 <file path=ppt/theme/theme1.xml><?xml version="1.0" encoding="utf-8"?>
-<a:theme xmlns:a="http://schemas.openxmlformats.org/drawingml/2006/main" name="Frame">
+<a:theme xmlns:a="http://schemas.openxmlformats.org/drawingml/2006/main" name="Retrospect">
   <a:themeElements>
-    <a:clrScheme name="Frame">
+    <a:clrScheme name="Retrospect">
       <a:dk1>
-        <a:srgbClr val="000000"/>
+        <a:sysClr val="windowText" lastClr="000000"/>
       </a:dk1>
       <a:lt1>
-        <a:srgbClr val="FFFFFF"/>
+        <a:sysClr val="window" lastClr="FFFFFF"/>
       </a:lt1>
       <a:dk2>
-        <a:srgbClr val="545454"/>
+        <a:srgbClr val="344068"/>
       </a:dk2>
       <a:lt2>
-        <a:srgbClr val="BFBFBF"/>
+        <a:srgbClr val="D9E0E6"/>
       </a:lt2>
       <a:accent1>
-        <a:srgbClr val="40BAD2"/>
+        <a:srgbClr val="1CADE4"/>
       </a:accent1>
       <a:accent2>
-        <a:srgbClr val="FAB900"/>
+        <a:srgbClr val="2683C6"/>
       </a:accent2>
       <a:accent3>
-        <a:srgbClr val="90BB23"/>
+        <a:srgbClr val="28C4CC"/>
       </a:accent3>
       <a:accent4>
-        <a:srgbClr val="EE7008"/>
+        <a:srgbClr val="42BA97"/>
       </a:accent4>
       <a:accent5>
-        <a:srgbClr val="1AB39F"/>
+        <a:srgbClr val="3E8853"/>
       </a:accent5>
       <a:accent6>
-        <a:srgbClr val="D5393D"/>
+        <a:srgbClr val="62A39F"/>
       </a:accent6>
       <a:hlink>
-        <a:srgbClr val="90BB23"/>
+        <a:srgbClr val="6EAC1C"/>
       </a:hlink>
       <a:folHlink>
-        <a:srgbClr val="EE7008"/>
+        <a:srgbClr val="B26B02"/>
       </a:folHlink>
     </a:clrScheme>
-    <a:fontScheme name="Frame">
+    <a:fontScheme name="Retrospect">
       <a:majorFont>
-        <a:latin typeface="Corbel" panose="020B0503020204020204"/>
+        <a:latin typeface="Calibri Light" panose="020F0302020204030204"/>
         <a:ea typeface=""/>
         <a:cs typeface=""/>
-        <a:font script="Jpan" typeface="ＭＳ ゴシック"/>
-        <a:font script="Hang" typeface="HY중고딕"/>
-        <a:font script="Hans" typeface="幼圆"/>
-        <a:font script="Hant" typeface="微軟正黑體"/>
-        <a:font script="Arab" typeface="Tahoma"/>
-        <a:font script="Hebr" typeface="Gisha"/>
-        <a:font script="Thai" typeface="DilleniaUPC"/>
+        <a:font script="Jpan" typeface="ＭＳ Ｐゴシック"/>
+        <a:font script="Hang" typeface="맑은 고딕"/>
+        <a:font script="Hans" typeface="宋体"/>
+        <a:font script="Hant" typeface="新細明體"/>
+        <a:font script="Arab" typeface="Times New Roman"/>
+        <a:font script="Hebr" typeface="Times New Roman"/>
+        <a:font script="Thai" typeface="Angsana New"/>
+        <a:font script="Ethi" typeface="Nyala"/>
+        <a:font script="Beng" typeface="Vrinda"/>
+        <a:font script="Gujr" typeface="Shruti"/>
+        <a:font script="Khmr" typeface="MoolBoran"/>
+        <a:font script="Knda" typeface="Tunga"/>
+        <a:font script="Guru" typeface="Raavi"/>
+        <a:font script="Cans" typeface="Euphemia"/>
+        <a:font script="Cher" typeface="Plantagenet Cherokee"/>
+        <a:font script="Yiii" typeface="Microsoft Yi Baiti"/>
+        <a:font script="Tibt" typeface="Microsoft Himalaya"/>
+        <a:font script="Thaa" typeface="MV Boli"/>
+        <a:font script="Deva" typeface="Mangal"/>
+        <a:font script="Telu" typeface="Gautami"/>
+        <a:font script="Taml" typeface="Latha"/>
+        <a:font script="Syrc" typeface="Estrangelo Edessa"/>
+        <a:font script="Orya" typeface="Kalinga"/>
+        <a:font script="Mlym" typeface="Kartika"/>
+        <a:font script="Laoo" typeface="DokChampa"/>
+        <a:font script="Sinh" typeface="Iskoola Pota"/>
+        <a:font script="Mong" typeface="Mongolian Baiti"/>
+        <a:font script="Viet" typeface="Times New Roman"/>
+        <a:font script="Uigh" typeface="Microsoft Uighur"/>
+        <a:font script="Geor" typeface="Sylfaen"/>
+      </a:majorFont>
+      <a:minorFont>
+        <a:latin typeface="Calibri" panose="020F0502020204030204"/>
+        <a:ea typeface=""/>
+        <a:cs typeface=""/>
+        <a:font script="Jpan" typeface="ＭＳ Ｐゴシック"/>
+        <a:font script="Hang" typeface="맑은 고딕"/>
+        <a:font script="Hans" typeface="宋体"/>
+        <a:font script="Hant" typeface="新細明體"/>
+        <a:font script="Arab" typeface="Arial"/>
+        <a:font script="Hebr" typeface="Arial"/>
+        <a:font script="Thai" typeface="Cordia New"/>
         <a:font script="Ethi" typeface="Nyala"/>
         <a:font script="Beng" typeface="Vrinda"/>
         <a:font script="Gujr" typeface="Shruti"/>
@@ -3916,83 +5086,93 @@
         <a:font script="Laoo" typeface="DokChampa"/>
         <a:font script="Sinh" typeface="Iskoola Pota"/>
         <a:font script="Mong" typeface="Mongolian Baiti"/>
-        <a:font script="Viet" typeface="Tahoma"/>
-        <a:font script="Uigh" typeface="Microsoft Uighur"/>
-        <a:font script="Geor" typeface="Sylfaen"/>
-      </a:majorFont>
-      <a:minorFont>
-        <a:latin typeface="Corbel" panose="020B0503020204020204"/>
-        <a:ea typeface=""/>
-        <a:cs typeface=""/>
-        <a:font script="Jpan" typeface="ＭＳ ゴシック"/>
-        <a:font script="Hang" typeface="HY중고딕"/>
-        <a:font script="Hans" typeface="幼圆"/>
-        <a:font script="Hant" typeface="微軟正黑體"/>
-        <a:font script="Arab" typeface="Tahoma"/>
-        <a:font script="Hebr" typeface="Gisha"/>
-        <a:font script="Thai" typeface="DilleniaUPC"/>
-        <a:font script="Ethi" typeface="Nyala"/>
-        <a:font script="Beng" typeface="Vrinda"/>
-        <a:font script="Gujr" typeface="Shruti"/>
-        <a:font script="Khmr" typeface="DaunPenh"/>
-        <a:font script="Knda" typeface="Tunga"/>
-        <a:font script="Guru" typeface="Raavi"/>
-        <a:font script="Cans" typeface="Euphemia"/>
-        <a:font script="Cher" typeface="Plantagenet Cherokee"/>
-        <a:font script="Yiii" typeface="Microsoft Yi Baiti"/>
-        <a:font script="Tibt" typeface="Microsoft Himalaya"/>
-        <a:font script="Thaa" typeface="MV Boli"/>
-        <a:font script="Deva" typeface="Mangal"/>
-        <a:font script="Telu" typeface="Gautami"/>
-        <a:font script="Taml" typeface="Latha"/>
-        <a:font script="Syrc" typeface="Estrangelo Edessa"/>
-        <a:font script="Orya" typeface="Kalinga"/>
-        <a:font script="Mlym" typeface="Kartika"/>
-        <a:font script="Laoo" typeface="DokChampa"/>
-        <a:font script="Sinh" typeface="Iskoola Pota"/>
-        <a:font script="Mong" typeface="Mongolian Baiti"/>
-        <a:font script="Viet" typeface="Verdana"/>
+        <a:font script="Viet" typeface="Arial"/>
         <a:font script="Uigh" typeface="Microsoft Uighur"/>
         <a:font script="Geor" typeface="Sylfaen"/>
       </a:minorFont>
     </a:fontScheme>
-    <a:fmtScheme name="Frame">
+    <a:fmtScheme name="Retrospect">
       <a:fillStyleLst>
         <a:solidFill>
           <a:schemeClr val="phClr"/>
         </a:solidFill>
-        <a:solidFill>
-          <a:schemeClr val="phClr">
-            <a:tint val="65000"/>
-          </a:schemeClr>
-        </a:solidFill>
-        <a:solidFill>
-          <a:schemeClr val="phClr">
-            <a:shade val="80000"/>
-            <a:satMod val="150000"/>
-          </a:schemeClr>
-        </a:solidFill>
+        <a:gradFill rotWithShape="1">
+          <a:gsLst>
+            <a:gs pos="0">
+              <a:schemeClr val="phClr">
+                <a:tint val="65000"/>
+                <a:shade val="92000"/>
+                <a:satMod val="130000"/>
+              </a:schemeClr>
+            </a:gs>
+            <a:gs pos="45000">
+              <a:schemeClr val="phClr">
+                <a:tint val="60000"/>
+                <a:shade val="99000"/>
+                <a:satMod val="120000"/>
+              </a:schemeClr>
+            </a:gs>
+            <a:gs pos="100000">
+              <a:schemeClr val="phClr">
+                <a:tint val="55000"/>
+                <a:satMod val="140000"/>
+              </a:schemeClr>
+            </a:gs>
+          </a:gsLst>
+          <a:path path="circle">
+            <a:fillToRect l="100000" t="100000" r="100000" b="100000"/>
+          </a:path>
+        </a:gradFill>
+        <a:gradFill rotWithShape="1">
+          <a:gsLst>
+            <a:gs pos="0">
+              <a:schemeClr val="phClr">
+                <a:shade val="85000"/>
+                <a:satMod val="130000"/>
+              </a:schemeClr>
+            </a:gs>
+            <a:gs pos="34000">
+              <a:schemeClr val="phClr">
+                <a:shade val="87000"/>
+                <a:satMod val="125000"/>
+              </a:schemeClr>
+            </a:gs>
+            <a:gs pos="70000">
+              <a:schemeClr val="phClr">
+                <a:tint val="100000"/>
+                <a:shade val="90000"/>
+                <a:satMod val="130000"/>
+              </a:schemeClr>
+            </a:gs>
+            <a:gs pos="100000">
+              <a:schemeClr val="phClr">
+                <a:tint val="100000"/>
+                <a:shade val="100000"/>
+                <a:satMod val="110000"/>
+              </a:schemeClr>
+            </a:gs>
+          </a:gsLst>
+          <a:path path="circle">
+            <a:fillToRect l="100000" t="100000" r="100000" b="100000"/>
+          </a:path>
+        </a:gradFill>
       </a:fillStyleLst>
       <a:lnStyleLst>
-        <a:ln w="9525" cap="flat" cmpd="sng" algn="ctr">
+        <a:ln w="12700" cap="flat" cmpd="sng" algn="ctr">
           <a:solidFill>
             <a:schemeClr val="phClr"/>
           </a:solidFill>
           <a:prstDash val="solid"/>
         </a:ln>
-        <a:ln w="10795" cap="flat" cmpd="sng" algn="ctr">
+        <a:ln w="15875" cap="flat" cmpd="sng" algn="ctr">
           <a:solidFill>
             <a:schemeClr val="phClr"/>
           </a:solidFill>
           <a:prstDash val="solid"/>
         </a:ln>
-        <a:ln w="17145" cap="flat" cmpd="sng" algn="ctr">
+        <a:ln w="25400" cap="flat" cmpd="sng" algn="ctr">
           <a:solidFill>
-            <a:schemeClr val="phClr">
-              <a:shade val="95000"/>
-              <a:alpha val="50000"/>
-              <a:satMod val="150000"/>
-            </a:schemeClr>
+            <a:schemeClr val="phClr"/>
           </a:solidFill>
           <a:prstDash val="solid"/>
         </a:ln>
@@ -4002,13 +5182,19 @@
           <a:effectLst/>
         </a:effectStyle>
         <a:effectStyle>
-          <a:effectLst/>
+          <a:effectLst>
+            <a:outerShdw blurRad="38100" dist="25400" dir="2700000" algn="br" rotWithShape="0">
+              <a:srgbClr val="000000">
+                <a:alpha val="60000"/>
+              </a:srgbClr>
+            </a:outerShdw>
+          </a:effectLst>
         </a:effectStyle>
         <a:effectStyle>
           <a:effectLst>
-            <a:outerShdw blurRad="44450" dist="13970" dir="5400000" algn="ctr" rotWithShape="0">
+            <a:outerShdw blurRad="44450" dist="25400" dir="2700000" algn="br" rotWithShape="0">
               <a:srgbClr val="000000">
-                <a:alpha val="45000"/>
+                <a:alpha val="60000"/>
               </a:srgbClr>
             </a:outerShdw>
           </a:effectLst>
@@ -4016,10 +5202,12 @@
             <a:camera prst="orthographicFront">
               <a:rot lat="0" lon="0" rev="0"/>
             </a:camera>
-            <a:lightRig rig="twoPt" dir="tl"/>
+            <a:lightRig rig="threePt" dir="t">
+              <a:rot lat="0" lon="0" rev="19800000"/>
+            </a:lightRig>
           </a:scene3d>
           <a:sp3d prstMaterial="flat">
-            <a:bevelT w="12700" h="25400" prst="coolSlant"/>
+            <a:bevelT w="25400" h="31750"/>
           </a:sp3d>
         </a:effectStyle>
       </a:effectStyleLst>
@@ -4029,37 +5217,36 @@
         </a:solidFill>
         <a:solidFill>
           <a:schemeClr val="phClr">
-            <a:tint val="95000"/>
-            <a:satMod val="170000"/>
+            <a:tint val="90000"/>
+            <a:shade val="97000"/>
+            <a:satMod val="130000"/>
           </a:schemeClr>
         </a:solidFill>
         <a:gradFill rotWithShape="1">
           <a:gsLst>
             <a:gs pos="0">
               <a:schemeClr val="phClr">
-                <a:tint val="93000"/>
-                <a:shade val="98000"/>
-                <a:satMod val="120000"/>
-                <a:lumMod val="102000"/>
+                <a:tint val="96000"/>
+                <a:shade val="99000"/>
+                <a:satMod val="140000"/>
               </a:schemeClr>
             </a:gs>
-            <a:gs pos="48000">
+            <a:gs pos="65000">
               <a:schemeClr val="phClr">
-                <a:tint val="98000"/>
-                <a:shade val="90000"/>
-                <a:satMod val="110000"/>
-                <a:lumMod val="103000"/>
+                <a:tint val="100000"/>
+                <a:shade val="80000"/>
+                <a:satMod val="130000"/>
               </a:schemeClr>
             </a:gs>
             <a:gs pos="100000">
               <a:schemeClr val="phClr">
-                <a:tint val="98000"/>
-                <a:shade val="80000"/>
-                <a:satMod val="100000"/>
+                <a:tint val="100000"/>
+                <a:shade val="48000"/>
+                <a:satMod val="120000"/>
               </a:schemeClr>
             </a:gs>
           </a:gsLst>
-          <a:lin ang="5400000" scaled="0"/>
+          <a:lin ang="16200000" scaled="0"/>
         </a:gradFill>
       </a:bgFillStyleLst>
     </a:fmtScheme>
@@ -4068,7 +5255,7 @@
   <a:extraClrSchemeLst/>
   <a:extLst>
     <a:ext uri="{05A4C25C-085E-4340-85A3-A5531E510DB2}">
-      <thm15:themeFamily xmlns:thm15="http://schemas.microsoft.com/office/thememl/2012/main" name="Frame" id="{F226E7A2-7162-461C-9490-D27D9DC04E43}" vid="{629A0216-3BBD-45C0-B63F-2683BEA18F60}"/>
+      <thm15:themeFamily xmlns:thm15="http://schemas.microsoft.com/office/thememl/2012/main" name="Retrospect" id="{5F128B03-DCCA-4EEB-AB3B-CF2899314A46}" vid="{9CC26709-368C-4D72-9060-94E5B3FF3CD6}"/>
     </a:ext>
   </a:extLst>
 </a:theme>

</xml_diff>

<commit_message>
finished my duo work
finished the redesigned interfaces of the application under the specific file and added the button redesign choices to the power point file
</commit_message>
<xml_diff>
--- a/Creating Account/Redesign Powerpoint.pptx
+++ b/Creating Account/Redesign Powerpoint.pptx
@@ -8,7 +8,7 @@
     <p:sldId id="256" r:id="rId2"/>
     <p:sldId id="258" r:id="rId3"/>
     <p:sldId id="259" r:id="rId4"/>
-    <p:sldId id="260" r:id="rId5"/>
+    <p:sldId id="262" r:id="rId5"/>
   </p:sldIdLst>
   <p:sldSz cx="12192000" cy="6858000"/>
   <p:notesSz cx="6858000" cy="9144000"/>
@@ -341,7 +341,7 @@
           <a:p>
             <a:fld id="{4A1D9E61-7A34-4455-A944-7760DD9E2D94}" type="datetimeFigureOut">
               <a:rPr lang="en-US" smtClean="0"/>
-              <a:t>4/12/2022</a:t>
+              <a:t>4/13/2022</a:t>
             </a:fld>
             <a:endParaRPr lang="en-US"/>
           </a:p>
@@ -549,7 +549,7 @@
           <a:p>
             <a:fld id="{4A1D9E61-7A34-4455-A944-7760DD9E2D94}" type="datetimeFigureOut">
               <a:rPr lang="en-US" smtClean="0"/>
-              <a:t>4/12/2022</a:t>
+              <a:t>4/13/2022</a:t>
             </a:fld>
             <a:endParaRPr lang="en-US"/>
           </a:p>
@@ -805,7 +805,7 @@
           <a:p>
             <a:fld id="{4A1D9E61-7A34-4455-A944-7760DD9E2D94}" type="datetimeFigureOut">
               <a:rPr lang="en-US" smtClean="0"/>
-              <a:t>4/12/2022</a:t>
+              <a:t>4/13/2022</a:t>
             </a:fld>
             <a:endParaRPr lang="en-US"/>
           </a:p>
@@ -975,7 +975,7 @@
           <a:p>
             <a:fld id="{4A1D9E61-7A34-4455-A944-7760DD9E2D94}" type="datetimeFigureOut">
               <a:rPr lang="en-US" smtClean="0"/>
-              <a:t>4/12/2022</a:t>
+              <a:t>4/13/2022</a:t>
             </a:fld>
             <a:endParaRPr lang="en-US"/>
           </a:p>
@@ -1318,7 +1318,7 @@
           <a:p>
             <a:fld id="{4A1D9E61-7A34-4455-A944-7760DD9E2D94}" type="datetimeFigureOut">
               <a:rPr lang="en-US" smtClean="0"/>
-              <a:t>4/12/2022</a:t>
+              <a:t>4/13/2022</a:t>
             </a:fld>
             <a:endParaRPr lang="en-US"/>
           </a:p>
@@ -1593,7 +1593,7 @@
           <a:p>
             <a:fld id="{4A1D9E61-7A34-4455-A944-7760DD9E2D94}" type="datetimeFigureOut">
               <a:rPr lang="en-US" smtClean="0"/>
-              <a:t>4/12/2022</a:t>
+              <a:t>4/13/2022</a:t>
             </a:fld>
             <a:endParaRPr lang="en-US"/>
           </a:p>
@@ -1972,7 +1972,7 @@
           <a:p>
             <a:fld id="{4A1D9E61-7A34-4455-A944-7760DD9E2D94}" type="datetimeFigureOut">
               <a:rPr lang="en-US" smtClean="0"/>
-              <a:t>4/12/2022</a:t>
+              <a:t>4/13/2022</a:t>
             </a:fld>
             <a:endParaRPr lang="en-US"/>
           </a:p>
@@ -2090,7 +2090,7 @@
           <a:p>
             <a:fld id="{4A1D9E61-7A34-4455-A944-7760DD9E2D94}" type="datetimeFigureOut">
               <a:rPr lang="en-US" smtClean="0"/>
-              <a:t>4/12/2022</a:t>
+              <a:t>4/13/2022</a:t>
             </a:fld>
             <a:endParaRPr lang="en-US"/>
           </a:p>
@@ -2261,7 +2261,7 @@
           <a:p>
             <a:fld id="{4A1D9E61-7A34-4455-A944-7760DD9E2D94}" type="datetimeFigureOut">
               <a:rPr lang="en-US" smtClean="0"/>
-              <a:t>4/12/2022</a:t>
+              <a:t>4/13/2022</a:t>
             </a:fld>
             <a:endParaRPr lang="en-US"/>
           </a:p>
@@ -2615,7 +2615,7 @@
           <a:p>
             <a:fld id="{4A1D9E61-7A34-4455-A944-7760DD9E2D94}" type="datetimeFigureOut">
               <a:rPr lang="en-US" smtClean="0"/>
-              <a:t>4/12/2022</a:t>
+              <a:t>4/13/2022</a:t>
             </a:fld>
             <a:endParaRPr lang="en-US"/>
           </a:p>
@@ -2992,7 +2992,7 @@
           <a:p>
             <a:fld id="{4A1D9E61-7A34-4455-A944-7760DD9E2D94}" type="datetimeFigureOut">
               <a:rPr lang="en-US" smtClean="0"/>
-              <a:t>4/12/2022</a:t>
+              <a:t>4/13/2022</a:t>
             </a:fld>
             <a:endParaRPr lang="en-US"/>
           </a:p>
@@ -3279,7 +3279,7 @@
           <a:p>
             <a:fld id="{4A1D9E61-7A34-4455-A944-7760DD9E2D94}" type="datetimeFigureOut">
               <a:rPr lang="en-US" smtClean="0"/>
-              <a:t>4/12/2022</a:t>
+              <a:t>4/13/2022</a:t>
             </a:fld>
             <a:endParaRPr lang="en-US"/>
           </a:p>
@@ -4047,7 +4047,7 @@
         </p:nvSpPr>
         <p:spPr>
           <a:xfrm>
-            <a:off x="500363" y="165370"/>
+            <a:off x="500363" y="170975"/>
             <a:ext cx="8706255" cy="461665"/>
           </a:xfrm>
           <a:prstGeom prst="rect">
@@ -4335,11 +4335,11 @@
   <p:clrMapOvr>
     <a:masterClrMapping/>
   </p:clrMapOvr>
-  <mc:AlternateContent xmlns:mc="http://schemas.openxmlformats.org/markup-compatibility/2006">
-    <mc:Choice xmlns:p14="http://schemas.microsoft.com/office/powerpoint/2010/main" Requires="p14">
+  <mc:AlternateContent xmlns:mc="http://schemas.openxmlformats.org/markup-compatibility/2006" xmlns:p14="http://schemas.microsoft.com/office/powerpoint/2010/main">
+    <mc:Choice Requires="p14">
       <p:transition p14:dur="10"/>
     </mc:Choice>
-    <mc:Fallback>
+    <mc:Fallback xmlns="">
       <p:transition/>
     </mc:Fallback>
   </mc:AlternateContent>
@@ -4857,85 +4857,10 @@
       </p:grpSpPr>
       <p:sp>
         <p:nvSpPr>
-          <p:cNvPr id="2" name="Title 1">
+          <p:cNvPr id="2" name="TextBox 1">
             <a:extLst>
               <a:ext uri="{FF2B5EF4-FFF2-40B4-BE49-F238E27FC236}">
-                <a16:creationId xmlns:a16="http://schemas.microsoft.com/office/drawing/2014/main" id="{D7550B6D-AF54-4EAA-B0A0-C08D9EB4A5A9}"/>
-              </a:ext>
-            </a:extLst>
-          </p:cNvPr>
-          <p:cNvSpPr>
-            <a:spLocks noGrp="1"/>
-          </p:cNvSpPr>
-          <p:nvPr>
-            <p:ph type="title"/>
-          </p:nvPr>
-        </p:nvSpPr>
-        <p:spPr/>
-        <p:txBody>
-          <a:bodyPr/>
-          <a:lstStyle/>
-          <a:p>
-            <a:endParaRPr lang="en-US" dirty="0"/>
-          </a:p>
-        </p:txBody>
-      </p:sp>
-      <p:sp>
-        <p:nvSpPr>
-          <p:cNvPr id="3" name="Content Placeholder 2">
-            <a:extLst>
-              <a:ext uri="{FF2B5EF4-FFF2-40B4-BE49-F238E27FC236}">
-                <a16:creationId xmlns:a16="http://schemas.microsoft.com/office/drawing/2014/main" id="{C744107B-3D20-45E0-AA1D-A8554F50E764}"/>
-              </a:ext>
-            </a:extLst>
-          </p:cNvPr>
-          <p:cNvSpPr>
-            <a:spLocks noGrp="1"/>
-          </p:cNvSpPr>
-          <p:nvPr>
-            <p:ph sz="half" idx="1"/>
-          </p:nvPr>
-        </p:nvSpPr>
-        <p:spPr/>
-        <p:txBody>
-          <a:bodyPr/>
-          <a:lstStyle/>
-          <a:p>
-            <a:endParaRPr lang="en-US" dirty="0"/>
-          </a:p>
-        </p:txBody>
-      </p:sp>
-      <p:sp>
-        <p:nvSpPr>
-          <p:cNvPr id="4" name="Content Placeholder 3">
-            <a:extLst>
-              <a:ext uri="{FF2B5EF4-FFF2-40B4-BE49-F238E27FC236}">
-                <a16:creationId xmlns:a16="http://schemas.microsoft.com/office/drawing/2014/main" id="{085C5D42-DD97-488E-BB51-0111630D2618}"/>
-              </a:ext>
-            </a:extLst>
-          </p:cNvPr>
-          <p:cNvSpPr>
-            <a:spLocks noGrp="1"/>
-          </p:cNvSpPr>
-          <p:nvPr>
-            <p:ph sz="half" idx="2"/>
-          </p:nvPr>
-        </p:nvSpPr>
-        <p:spPr/>
-        <p:txBody>
-          <a:bodyPr/>
-          <a:lstStyle/>
-          <a:p>
-            <a:endParaRPr lang="en-US"/>
-          </a:p>
-        </p:txBody>
-      </p:sp>
-      <p:sp>
-        <p:nvSpPr>
-          <p:cNvPr id="5" name="TextBox 4">
-            <a:extLst>
-              <a:ext uri="{FF2B5EF4-FFF2-40B4-BE49-F238E27FC236}">
-                <a16:creationId xmlns:a16="http://schemas.microsoft.com/office/drawing/2014/main" id="{CB08175E-E2B2-4E14-B9F6-A76069B78E9B}"/>
+                <a16:creationId xmlns:a16="http://schemas.microsoft.com/office/drawing/2014/main" id="{FBCB56F2-2AB1-4121-99EC-7933D4136AA2}"/>
               </a:ext>
             </a:extLst>
           </p:cNvPr>
@@ -4944,8 +4869,8 @@
         </p:nvSpPr>
         <p:spPr>
           <a:xfrm>
-            <a:off x="252919" y="252919"/>
-            <a:ext cx="8706255" cy="369332"/>
+            <a:off x="500363" y="170975"/>
+            <a:ext cx="8706255" cy="461665"/>
           </a:xfrm>
           <a:prstGeom prst="rect">
             <a:avLst/>
@@ -4959,16 +4884,282 @@
           <a:lstStyle/>
           <a:p>
             <a:r>
-              <a:rPr lang="en-US" dirty="0"/>
-              <a:t>Button Design Choices</a:t>
-            </a:r>
-          </a:p>
-        </p:txBody>
-      </p:sp>
+              <a:rPr lang="en-US" sz="2400" dirty="0"/>
+              <a:t>Buttons Design Choices:</a:t>
+            </a:r>
+          </a:p>
+        </p:txBody>
+      </p:sp>
+      <p:sp>
+        <p:nvSpPr>
+          <p:cNvPr id="5" name="TextBox 4">
+            <a:extLst>
+              <a:ext uri="{FF2B5EF4-FFF2-40B4-BE49-F238E27FC236}">
+                <a16:creationId xmlns:a16="http://schemas.microsoft.com/office/drawing/2014/main" id="{76716995-4268-4C29-81A0-2ADA1CCA47C9}"/>
+              </a:ext>
+            </a:extLst>
+          </p:cNvPr>
+          <p:cNvSpPr txBox="1"/>
+          <p:nvPr/>
+        </p:nvSpPr>
+        <p:spPr>
+          <a:xfrm>
+            <a:off x="500363" y="1371600"/>
+            <a:ext cx="11234437" cy="923330"/>
+          </a:xfrm>
+          <a:prstGeom prst="rect">
+            <a:avLst/>
+          </a:prstGeom>
+          <a:noFill/>
+        </p:spPr>
+        <p:txBody>
+          <a:bodyPr wrap="square" rtlCol="0">
+            <a:spAutoFit/>
+          </a:bodyPr>
+          <a:lstStyle/>
+          <a:p>
+            <a:r>
+              <a:rPr lang="en-GB" dirty="0"/>
+              <a:t>For out design we have 4 kinds of buttons that we used for different actions.</a:t>
+            </a:r>
+          </a:p>
+          <a:p>
+            <a:r>
+              <a:rPr lang="en-GB" dirty="0"/>
+              <a:t>	First Button type is the raised button , which is used for the primary action in each interface, for example in the 	verification page :</a:t>
+            </a:r>
+          </a:p>
+        </p:txBody>
+      </p:sp>
+      <p:sp>
+        <p:nvSpPr>
+          <p:cNvPr id="9" name="TextBox 8">
+            <a:extLst>
+              <a:ext uri="{FF2B5EF4-FFF2-40B4-BE49-F238E27FC236}">
+                <a16:creationId xmlns:a16="http://schemas.microsoft.com/office/drawing/2014/main" id="{2C6F82B2-8097-4AF6-A445-E3AB604C4017}"/>
+              </a:ext>
+            </a:extLst>
+          </p:cNvPr>
+          <p:cNvSpPr txBox="1"/>
+          <p:nvPr/>
+        </p:nvSpPr>
+        <p:spPr>
+          <a:xfrm>
+            <a:off x="965288" y="2737344"/>
+            <a:ext cx="10374923" cy="646331"/>
+          </a:xfrm>
+          <a:prstGeom prst="rect">
+            <a:avLst/>
+          </a:prstGeom>
+          <a:noFill/>
+        </p:spPr>
+        <p:txBody>
+          <a:bodyPr wrap="square" rtlCol="0">
+            <a:spAutoFit/>
+          </a:bodyPr>
+          <a:lstStyle/>
+          <a:p>
+            <a:r>
+              <a:rPr lang="en-GB" dirty="0"/>
+              <a:t>The second type is the Ghost Button, used for the secondary actions and we used it for the back button in each interface:</a:t>
+            </a:r>
+          </a:p>
+        </p:txBody>
+      </p:sp>
+      <p:pic>
+        <p:nvPicPr>
+          <p:cNvPr id="13" name="Picture 12">
+            <a:extLst>
+              <a:ext uri="{FF2B5EF4-FFF2-40B4-BE49-F238E27FC236}">
+                <a16:creationId xmlns:a16="http://schemas.microsoft.com/office/drawing/2014/main" id="{3F240CB3-B93A-4D5D-9271-633BB4D446B1}"/>
+              </a:ext>
+            </a:extLst>
+          </p:cNvPr>
+          <p:cNvPicPr>
+            <a:picLocks noChangeAspect="1"/>
+          </p:cNvPicPr>
+          <p:nvPr/>
+        </p:nvPicPr>
+        <p:blipFill>
+          <a:blip r:embed="rId2"/>
+          <a:stretch>
+            <a:fillRect/>
+          </a:stretch>
+        </p:blipFill>
+        <p:spPr>
+          <a:xfrm>
+            <a:off x="1070795" y="3411574"/>
+            <a:ext cx="655377" cy="655377"/>
+          </a:xfrm>
+          <a:prstGeom prst="rect">
+            <a:avLst/>
+          </a:prstGeom>
+        </p:spPr>
+      </p:pic>
+      <p:sp>
+        <p:nvSpPr>
+          <p:cNvPr id="14" name="TextBox 13">
+            <a:extLst>
+              <a:ext uri="{FF2B5EF4-FFF2-40B4-BE49-F238E27FC236}">
+                <a16:creationId xmlns:a16="http://schemas.microsoft.com/office/drawing/2014/main" id="{BA3EC8A5-80F0-4BBA-B291-225F5FBF840B}"/>
+              </a:ext>
+            </a:extLst>
+          </p:cNvPr>
+          <p:cNvSpPr txBox="1"/>
+          <p:nvPr/>
+        </p:nvSpPr>
+        <p:spPr>
+          <a:xfrm>
+            <a:off x="973015" y="4067913"/>
+            <a:ext cx="10456985" cy="369332"/>
+          </a:xfrm>
+          <a:prstGeom prst="rect">
+            <a:avLst/>
+          </a:prstGeom>
+          <a:noFill/>
+        </p:spPr>
+        <p:txBody>
+          <a:bodyPr wrap="square" rtlCol="0">
+            <a:spAutoFit/>
+          </a:bodyPr>
+          <a:lstStyle/>
+          <a:p>
+            <a:r>
+              <a:rPr lang="en-GB" dirty="0"/>
+              <a:t>The third type is the text button, used for less important actions and to not distract users from the interface:</a:t>
+            </a:r>
+          </a:p>
+        </p:txBody>
+      </p:sp>
+      <p:pic>
+        <p:nvPicPr>
+          <p:cNvPr id="18" name="Picture 17">
+            <a:extLst>
+              <a:ext uri="{FF2B5EF4-FFF2-40B4-BE49-F238E27FC236}">
+                <a16:creationId xmlns:a16="http://schemas.microsoft.com/office/drawing/2014/main" id="{62B910E1-FCFC-40D3-9F54-E43657E7CD2C}"/>
+              </a:ext>
+            </a:extLst>
+          </p:cNvPr>
+          <p:cNvPicPr>
+            <a:picLocks noChangeAspect="1"/>
+          </p:cNvPicPr>
+          <p:nvPr/>
+        </p:nvPicPr>
+        <p:blipFill>
+          <a:blip r:embed="rId3"/>
+          <a:stretch>
+            <a:fillRect/>
+          </a:stretch>
+        </p:blipFill>
+        <p:spPr>
+          <a:xfrm>
+            <a:off x="965288" y="4379533"/>
+            <a:ext cx="1889924" cy="365792"/>
+          </a:xfrm>
+          <a:prstGeom prst="rect">
+            <a:avLst/>
+          </a:prstGeom>
+        </p:spPr>
+      </p:pic>
+      <p:pic>
+        <p:nvPicPr>
+          <p:cNvPr id="20" name="Picture 19">
+            <a:extLst>
+              <a:ext uri="{FF2B5EF4-FFF2-40B4-BE49-F238E27FC236}">
+                <a16:creationId xmlns:a16="http://schemas.microsoft.com/office/drawing/2014/main" id="{6ECF51BA-5F64-4F44-A860-2D7B45281A41}"/>
+              </a:ext>
+            </a:extLst>
+          </p:cNvPr>
+          <p:cNvPicPr>
+            <a:picLocks noChangeAspect="1"/>
+          </p:cNvPicPr>
+          <p:nvPr/>
+        </p:nvPicPr>
+        <p:blipFill>
+          <a:blip r:embed="rId4"/>
+          <a:stretch>
+            <a:fillRect/>
+          </a:stretch>
+        </p:blipFill>
+        <p:spPr>
+          <a:xfrm>
+            <a:off x="1045305" y="2237136"/>
+            <a:ext cx="1686172" cy="469002"/>
+          </a:xfrm>
+          <a:prstGeom prst="rect">
+            <a:avLst/>
+          </a:prstGeom>
+        </p:spPr>
+      </p:pic>
+      <p:sp>
+        <p:nvSpPr>
+          <p:cNvPr id="21" name="TextBox 20">
+            <a:extLst>
+              <a:ext uri="{FF2B5EF4-FFF2-40B4-BE49-F238E27FC236}">
+                <a16:creationId xmlns:a16="http://schemas.microsoft.com/office/drawing/2014/main" id="{AE4CAAC9-301B-4CC1-913B-6382096A0E8B}"/>
+              </a:ext>
+            </a:extLst>
+          </p:cNvPr>
+          <p:cNvSpPr txBox="1"/>
+          <p:nvPr/>
+        </p:nvSpPr>
+        <p:spPr>
+          <a:xfrm>
+            <a:off x="1070795" y="4745325"/>
+            <a:ext cx="9737881" cy="646331"/>
+          </a:xfrm>
+          <a:prstGeom prst="rect">
+            <a:avLst/>
+          </a:prstGeom>
+          <a:noFill/>
+        </p:spPr>
+        <p:txBody>
+          <a:bodyPr wrap="square" rtlCol="0">
+            <a:spAutoFit/>
+          </a:bodyPr>
+          <a:lstStyle/>
+          <a:p>
+            <a:r>
+              <a:rPr lang="en-GB" dirty="0"/>
+              <a:t>And lastly we used the toggle button, where the user can chose one of multiple options and only one can be chosen, we used it for the gender choice in the registration interface:</a:t>
+            </a:r>
+          </a:p>
+        </p:txBody>
+      </p:sp>
+      <p:pic>
+        <p:nvPicPr>
+          <p:cNvPr id="23" name="Picture 22">
+            <a:extLst>
+              <a:ext uri="{FF2B5EF4-FFF2-40B4-BE49-F238E27FC236}">
+                <a16:creationId xmlns:a16="http://schemas.microsoft.com/office/drawing/2014/main" id="{64583B6B-8940-478D-82F4-0A24020DF38B}"/>
+              </a:ext>
+            </a:extLst>
+          </p:cNvPr>
+          <p:cNvPicPr>
+            <a:picLocks noChangeAspect="1"/>
+          </p:cNvPicPr>
+          <p:nvPr/>
+        </p:nvPicPr>
+        <p:blipFill>
+          <a:blip r:embed="rId5"/>
+          <a:stretch>
+            <a:fillRect/>
+          </a:stretch>
+        </p:blipFill>
+        <p:spPr>
+          <a:xfrm>
+            <a:off x="1383324" y="5391656"/>
+            <a:ext cx="2636748" cy="662997"/>
+          </a:xfrm>
+          <a:prstGeom prst="rect">
+            <a:avLst/>
+          </a:prstGeom>
+        </p:spPr>
+      </p:pic>
     </p:spTree>
     <p:extLst>
       <p:ext uri="{BB962C8B-B14F-4D97-AF65-F5344CB8AC3E}">
-        <p14:creationId xmlns:p14="http://schemas.microsoft.com/office/powerpoint/2010/main" val="49572778"/>
+        <p14:creationId xmlns:p14="http://schemas.microsoft.com/office/powerpoint/2010/main" val="1934238007"/>
       </p:ext>
     </p:extLst>
   </p:cSld>

</xml_diff>